<commit_message>
Replace Project Progress with gantt chart
</commit_message>
<xml_diff>
--- a/presentation.pptx
+++ b/presentation.pptx
@@ -107,7 +107,18 @@
   </p:defaultTextStyle>
   <p:extLst>
     <p:ext uri="{EFAFB233-063F-42B5-8137-9DF3F51BA10A}">
-      <p15:sldGuideLst xmlns:p15="http://schemas.microsoft.com/office/powerpoint/2012/main"/>
+      <p15:sldGuideLst xmlns:p15="http://schemas.microsoft.com/office/powerpoint/2012/main">
+        <p15:guide id="1" orient="horz" pos="6735" userDrawn="1">
+          <p15:clr>
+            <a:srgbClr val="A4A3A4"/>
+          </p15:clr>
+        </p15:guide>
+        <p15:guide id="2" pos="4762" userDrawn="1">
+          <p15:clr>
+            <a:srgbClr val="A4A3A4"/>
+          </p15:clr>
+        </p15:guide>
+      </p15:sldGuideLst>
     </p:ext>
   </p:extLst>
 </p:presentation>
@@ -3085,35 +3096,6 @@
       </p:sp>
       <p:pic>
         <p:nvPicPr>
-          <p:cNvPr id="13" name="Inhaltsplatzhalter 12"/>
-          <p:cNvPicPr>
-            <a:picLocks noGrp="1" noChangeAspect="1"/>
-          </p:cNvPicPr>
-          <p:nvPr>
-            <p:ph sz="quarter" idx="4"/>
-          </p:nvPr>
-        </p:nvPicPr>
-        <p:blipFill>
-          <a:blip r:embed="rId2" cstate="print">
-            <a:extLst>
-              <a:ext uri="{28A0092B-C50C-407E-A947-70E740481C1C}">
-                <a14:useLocalDpi xmlns:a14="http://schemas.microsoft.com/office/drawing/2010/main" val="0"/>
-              </a:ext>
-            </a:extLst>
-          </a:blip>
-          <a:stretch>
-            <a:fillRect/>
-          </a:stretch>
-        </p:blipFill>
-        <p:spPr>
-          <a:xfrm>
-            <a:off x="14081862" y="20001583"/>
-            <a:ext cx="1038014" cy="1382042"/>
-          </a:xfrm>
-        </p:spPr>
-      </p:pic>
-      <p:pic>
-        <p:nvPicPr>
           <p:cNvPr id="12" name="Inhaltsplatzhalter 11"/>
           <p:cNvPicPr>
             <a:picLocks noGrp="1" noChangeAspect="1"/>
@@ -3123,7 +3105,7 @@
           </p:nvPr>
         </p:nvPicPr>
         <p:blipFill>
-          <a:blip r:embed="rId3">
+          <a:blip r:embed="rId2">
             <a:extLst>
               <a:ext uri="{28A0092B-C50C-407E-A947-70E740481C1C}">
                 <a14:useLocalDpi xmlns:a14="http://schemas.microsoft.com/office/drawing/2010/main" val="0"/>
@@ -3447,8 +3429,8 @@
         </p:nvSpPr>
         <p:spPr>
           <a:xfrm>
-            <a:off x="7718867" y="8692558"/>
-            <a:ext cx="6778968" cy="5738296"/>
+            <a:off x="8286750" y="8692558"/>
+            <a:ext cx="6211084" cy="5738296"/>
           </a:xfrm>
           <a:prstGeom prst="rect">
             <a:avLst/>
@@ -3791,7 +3773,7 @@
           <p:nvPr/>
         </p:nvPicPr>
         <p:blipFill>
-          <a:blip r:embed="rId4">
+          <a:blip r:embed="rId3">
             <a:extLst>
               <a:ext uri="{28A0092B-C50C-407E-A947-70E740481C1C}">
                 <a14:useLocalDpi xmlns:a14="http://schemas.microsoft.com/office/drawing/2010/main" val="0"/>
@@ -3821,7 +3803,7 @@
           <p:nvPr/>
         </p:nvPicPr>
         <p:blipFill>
-          <a:blip r:embed="rId5" cstate="print">
+          <a:blip r:embed="rId4" cstate="print">
             <a:extLst>
               <a:ext uri="{28A0092B-C50C-407E-A947-70E740481C1C}">
                 <a14:useLocalDpi xmlns:a14="http://schemas.microsoft.com/office/drawing/2010/main" val="0"/>
@@ -3857,7 +3839,7 @@
           <p:nvPr/>
         </p:nvPicPr>
         <p:blipFill>
-          <a:blip r:embed="rId6" cstate="print">
+          <a:blip r:embed="rId5" cstate="print">
             <a:extLst>
               <a:ext uri="{28A0092B-C50C-407E-A947-70E740481C1C}">
                 <a14:useLocalDpi xmlns:a14="http://schemas.microsoft.com/office/drawing/2010/main" val="0"/>
@@ -3886,22 +3868,21 @@
           </p:cNvPicPr>
           <p:nvPr/>
         </p:nvPicPr>
-        <p:blipFill>
-          <a:blip r:embed="rId7">
+        <p:blipFill rotWithShape="1">
+          <a:blip r:embed="rId6">
             <a:extLst>
               <a:ext uri="{28A0092B-C50C-407E-A947-70E740481C1C}">
                 <a14:useLocalDpi xmlns:a14="http://schemas.microsoft.com/office/drawing/2010/main" val="0"/>
               </a:ext>
             </a:extLst>
           </a:blip>
-          <a:stretch>
-            <a:fillRect/>
-          </a:stretch>
+          <a:srcRect l="-1223"/>
+          <a:stretch/>
         </p:blipFill>
         <p:spPr>
           <a:xfrm>
-            <a:off x="359944" y="8790415"/>
-            <a:ext cx="6824975" cy="5444425"/>
+            <a:off x="957944" y="8861727"/>
+            <a:ext cx="6908454" cy="5444425"/>
           </a:xfrm>
           <a:prstGeom prst="rect">
             <a:avLst/>
@@ -3917,7 +3898,7 @@
           <p:nvPr/>
         </p:nvPicPr>
         <p:blipFill>
-          <a:blip r:embed="rId8" cstate="print">
+          <a:blip r:embed="rId7" cstate="print">
             <a:extLst>
               <a:ext uri="{28A0092B-C50C-407E-A947-70E740481C1C}">
                 <a14:useLocalDpi xmlns:a14="http://schemas.microsoft.com/office/drawing/2010/main" val="0"/>
@@ -3930,7 +3911,7 @@
         </p:blipFill>
         <p:spPr>
           <a:xfrm flipH="1">
-            <a:off x="359944" y="11493508"/>
+            <a:off x="1041422" y="11564820"/>
             <a:ext cx="580154" cy="772433"/>
           </a:xfrm>
           <a:prstGeom prst="rect">
@@ -4003,8 +3984,8 @@
         </p:nvSpPr>
         <p:spPr>
           <a:xfrm>
-            <a:off x="1041422" y="15293379"/>
-            <a:ext cx="6330928" cy="5101469"/>
+            <a:off x="1041423" y="15135178"/>
+            <a:ext cx="6706914" cy="5101469"/>
           </a:xfrm>
           <a:prstGeom prst="rect">
             <a:avLst/>
@@ -4341,8 +4322,8 @@
         </p:nvSpPr>
         <p:spPr>
           <a:xfrm>
-            <a:off x="7718867" y="15293380"/>
-            <a:ext cx="6778968" cy="4934358"/>
+            <a:off x="8286750" y="15135179"/>
+            <a:ext cx="6211085" cy="322535"/>
           </a:xfrm>
           <a:prstGeom prst="rect">
             <a:avLst/>
@@ -4525,102 +4506,18 @@
               <a:t>Project Progress</a:t>
             </a:r>
           </a:p>
-          <a:p>
-            <a:pPr marL="457200" indent="-457200"/>
-            <a:r>
-              <a:rPr lang="en-GB" dirty="0" smtClean="0"/>
-              <a:t>Research: DONE</a:t>
-            </a:r>
-          </a:p>
-          <a:p>
-            <a:pPr marL="457200" indent="-457200"/>
-            <a:r>
-              <a:rPr lang="en-GB" dirty="0" smtClean="0"/>
-              <a:t>Experimental Work: DONE</a:t>
-            </a:r>
-          </a:p>
-          <a:p>
-            <a:pPr marL="1024174" lvl="1" indent="-457200"/>
-            <a:r>
-              <a:rPr lang="en-GB" dirty="0" smtClean="0"/>
-              <a:t>Using file based events to synchronize, coordinate and communicate between multiple instances</a:t>
-            </a:r>
-          </a:p>
-          <a:p>
-            <a:pPr marL="1024174" lvl="1" indent="-457200"/>
-            <a:r>
-              <a:rPr lang="en-GB" dirty="0" smtClean="0"/>
-              <a:t>Creating, starting and monitoring Docker container on the fly where the application has additional hardware requirements</a:t>
-            </a:r>
-          </a:p>
-          <a:p>
-            <a:pPr marL="457200" indent="-457200"/>
-            <a:r>
-              <a:rPr lang="en-GB" dirty="0" smtClean="0"/>
-              <a:t>Actual Implementation: FINALIZING (99%)</a:t>
-            </a:r>
-          </a:p>
-          <a:p>
-            <a:pPr marL="1024174" lvl="1" indent="-457200"/>
-            <a:r>
-              <a:rPr lang="en-GB" dirty="0" smtClean="0"/>
-              <a:t>Job distribution</a:t>
-            </a:r>
-          </a:p>
-          <a:p>
-            <a:pPr marL="1024174" lvl="1" indent="-457200"/>
-            <a:r>
-              <a:rPr lang="en-GB" dirty="0" smtClean="0"/>
-              <a:t>Error resilience (job failure, node failure, timeouts)</a:t>
-            </a:r>
-          </a:p>
-          <a:p>
-            <a:pPr marL="1024174" lvl="1" indent="-457200"/>
-            <a:r>
-              <a:rPr lang="en-GB" dirty="0" smtClean="0"/>
-              <a:t>Reacting on User Feedback (missing display of information, quality of life improvements)</a:t>
-            </a:r>
-          </a:p>
-          <a:p>
-            <a:pPr marL="457200" indent="-457200"/>
-            <a:r>
-              <a:rPr lang="en-GB" dirty="0" smtClean="0"/>
-              <a:t>Metrics, Analysis and Evaluation (60%)</a:t>
-            </a:r>
-          </a:p>
-          <a:p>
-            <a:pPr marL="1024174" lvl="1" indent="-457200"/>
-            <a:r>
-              <a:rPr lang="en-GB" dirty="0" smtClean="0"/>
-              <a:t>Finding fitting comparisons for now automated workflows</a:t>
-            </a:r>
-          </a:p>
-          <a:p>
-            <a:pPr marL="457200" indent="-457200"/>
-            <a:r>
-              <a:rPr lang="en-GB" dirty="0" smtClean="0"/>
-              <a:t>Thesis (70%)</a:t>
-            </a:r>
-          </a:p>
-          <a:p>
-            <a:pPr marL="1024174" lvl="1" indent="-457200"/>
-            <a:r>
-              <a:rPr lang="en-GB" dirty="0" smtClean="0"/>
-              <a:t>Writing everything down</a:t>
-            </a:r>
-          </a:p>
         </p:txBody>
       </p:sp>
       <p:pic>
         <p:nvPicPr>
-          <p:cNvPr id="45" name="Grafik 44"/>
+          <p:cNvPr id="47" name="Grafik 46"/>
           <p:cNvPicPr>
             <a:picLocks noChangeAspect="1"/>
           </p:cNvPicPr>
           <p:nvPr/>
         </p:nvPicPr>
         <p:blipFill>
-          <a:blip r:embed="rId9" cstate="print">
+          <a:blip r:embed="rId8">
             <a:extLst>
               <a:ext uri="{28A0092B-C50C-407E-A947-70E740481C1C}">
                 <a14:useLocalDpi xmlns:a14="http://schemas.microsoft.com/office/drawing/2010/main" val="0"/>
@@ -4633,8 +4530,8 @@
         </p:blipFill>
         <p:spPr>
           <a:xfrm>
-            <a:off x="6946626" y="19696150"/>
-            <a:ext cx="4088998" cy="1685925"/>
+            <a:off x="8286750" y="15732793"/>
+            <a:ext cx="6405543" cy="3270693"/>
           </a:xfrm>
           <a:prstGeom prst="rect">
             <a:avLst/>
@@ -4754,7 +4651,7 @@
           <a:bodyPr/>
           <a:lstStyle/>
           <a:p>
-            <a:endParaRPr lang="de-DE"/>
+            <a:endParaRPr lang="de-DE" dirty="0"/>
           </a:p>
         </p:txBody>
       </p:sp>
@@ -5746,6 +5643,66 @@
           </a:p>
         </p:txBody>
       </p:sp>
+      <p:pic>
+        <p:nvPicPr>
+          <p:cNvPr id="12" name="Grafik 11"/>
+          <p:cNvPicPr>
+            <a:picLocks noChangeAspect="1"/>
+          </p:cNvPicPr>
+          <p:nvPr/>
+        </p:nvPicPr>
+        <p:blipFill>
+          <a:blip r:embed="rId2" cstate="print">
+            <a:extLst>
+              <a:ext uri="{28A0092B-C50C-407E-A947-70E740481C1C}">
+                <a14:useLocalDpi xmlns:a14="http://schemas.microsoft.com/office/drawing/2010/main" val="0"/>
+              </a:ext>
+            </a:extLst>
+          </a:blip>
+          <a:stretch>
+            <a:fillRect/>
+          </a:stretch>
+        </p:blipFill>
+        <p:spPr>
+          <a:xfrm>
+            <a:off x="6946626" y="19696150"/>
+            <a:ext cx="4088998" cy="1685925"/>
+          </a:xfrm>
+          <a:prstGeom prst="rect">
+            <a:avLst/>
+          </a:prstGeom>
+        </p:spPr>
+      </p:pic>
+      <p:pic>
+        <p:nvPicPr>
+          <p:cNvPr id="13" name="Inhaltsplatzhalter 12"/>
+          <p:cNvPicPr>
+            <a:picLocks noChangeAspect="1"/>
+          </p:cNvPicPr>
+          <p:nvPr/>
+        </p:nvPicPr>
+        <p:blipFill>
+          <a:blip r:embed="rId3" cstate="print">
+            <a:extLst>
+              <a:ext uri="{28A0092B-C50C-407E-A947-70E740481C1C}">
+                <a14:useLocalDpi xmlns:a14="http://schemas.microsoft.com/office/drawing/2010/main" val="0"/>
+              </a:ext>
+            </a:extLst>
+          </a:blip>
+          <a:stretch>
+            <a:fillRect/>
+          </a:stretch>
+        </p:blipFill>
+        <p:spPr>
+          <a:xfrm>
+            <a:off x="14081862" y="20001583"/>
+            <a:ext cx="1038014" cy="1382042"/>
+          </a:xfrm>
+          <a:prstGeom prst="rect">
+            <a:avLst/>
+          </a:prstGeom>
+        </p:spPr>
+      </p:pic>
     </p:spTree>
     <p:extLst>
       <p:ext uri="{BB962C8B-B14F-4D97-AF65-F5344CB8AC3E}">

</xml_diff>

<commit_message>
Resize gantt chart, strip down wall of text
</commit_message>
<xml_diff>
--- a/presentation.pptx
+++ b/presentation.pptx
@@ -3173,8 +3173,8 @@
         </p:nvSpPr>
         <p:spPr>
           <a:xfrm>
-            <a:off x="1041422" y="4395005"/>
-            <a:ext cx="6706914" cy="4120331"/>
+            <a:off x="1041422" y="4395006"/>
+            <a:ext cx="6706914" cy="4466722"/>
           </a:xfrm>
           <a:prstGeom prst="rect">
             <a:avLst/>
@@ -3182,7 +3182,7 @@
         </p:spPr>
         <p:txBody>
           <a:bodyPr vert="horz" lIns="91440" tIns="45720" rIns="91440" bIns="45720" rtlCol="0">
-            <a:normAutofit fontScale="55000" lnSpcReduction="20000"/>
+            <a:normAutofit fontScale="70000" lnSpcReduction="20000"/>
           </a:bodyPr>
           <a:lstStyle>
             <a:lvl1pPr marL="283487" indent="-283487" algn="l" defTabSz="1133947" rtl="0" eaLnBrk="1" latinLnBrk="0" hangingPunct="1">
@@ -3361,35 +3361,29 @@
             <a:pPr marL="457200" indent="-457200"/>
             <a:r>
               <a:rPr lang="en-GB" dirty="0" smtClean="0"/>
-              <a:t>Utilizing Computer Vision and Artificial Intelligence to detect vehicles in video footage</a:t>
+              <a:t>Detecting vehicles in video footage using Computer Vision and Artificial Intelligence</a:t>
             </a:r>
           </a:p>
           <a:p>
             <a:pPr marL="457200" indent="-457200"/>
             <a:r>
               <a:rPr lang="en-GB" dirty="0" smtClean="0"/>
-              <a:t>Tracking vehicles throughout the video to determine speed, size, acceleration, class and position</a:t>
+              <a:t>Tracking vehicles throughout the video to determine speed, size, acceleration, class, position</a:t>
+            </a:r>
+            <a:r>
+              <a:rPr lang="en-GB" dirty="0"/>
+              <a:t> </a:t>
+            </a:r>
+            <a:r>
+              <a:rPr lang="en-GB" dirty="0" smtClean="0"/>
+              <a:t>and lane changes</a:t>
             </a:r>
           </a:p>
           <a:p>
             <a:pPr marL="457200" indent="-457200"/>
             <a:r>
               <a:rPr lang="en-GB" dirty="0" smtClean="0"/>
-              <a:t>Find lanes, assign vehicles to lanes and detect lane changes </a:t>
-            </a:r>
-          </a:p>
-          <a:p>
-            <a:pPr marL="457200" indent="-457200"/>
-            <a:r>
-              <a:rPr lang="en-GB" dirty="0" smtClean="0"/>
-              <a:t>Visualize detected vehicles</a:t>
-            </a:r>
-          </a:p>
-          <a:p>
-            <a:pPr marL="457200" indent="-457200"/>
-            <a:r>
-              <a:rPr lang="en-GB" dirty="0" smtClean="0"/>
-              <a:t>Provide data for traffic flow analysis (in other projects or for the customer)</a:t>
+              <a:t>Export data for further traffic flow analysis (in other projects or for the customer)</a:t>
             </a:r>
             <a:endParaRPr lang="en-GB" dirty="0"/>
           </a:p>
@@ -3405,7 +3399,7 @@
             </a:pPr>
             <a:r>
               <a:rPr lang="en-GB" b="1" dirty="0" smtClean="0"/>
-              <a:t>The Goal</a:t>
+              <a:t>Main Goal</a:t>
             </a:r>
             <a:endParaRPr lang="en-GB" dirty="0" smtClean="0"/>
           </a:p>
@@ -3413,7 +3407,7 @@
             <a:pPr marL="457200" indent="-457200"/>
             <a:r>
               <a:rPr lang="en-GB" dirty="0" smtClean="0"/>
-              <a:t>Automate manual and tedious multi-stage process of data extraction and distribute workload onto multiple servers</a:t>
+              <a:t>Automate manual workflow that distributes the workload onto servers and collects the data</a:t>
             </a:r>
             <a:endParaRPr lang="en-GB" dirty="0"/>
           </a:p>
@@ -3429,8 +3423,8 @@
         </p:nvSpPr>
         <p:spPr>
           <a:xfrm>
-            <a:off x="8286750" y="8692558"/>
-            <a:ext cx="6211084" cy="5738296"/>
+            <a:off x="8286750" y="8692557"/>
+            <a:ext cx="6211084" cy="6289895"/>
           </a:xfrm>
           <a:prstGeom prst="rect">
             <a:avLst/>
@@ -3438,7 +3432,7 @@
         </p:spPr>
         <p:txBody>
           <a:bodyPr vert="horz" lIns="91440" tIns="45720" rIns="91440" bIns="45720" rtlCol="0">
-            <a:normAutofit fontScale="55000" lnSpcReduction="20000"/>
+            <a:normAutofit fontScale="70000" lnSpcReduction="20000"/>
           </a:bodyPr>
           <a:lstStyle>
             <a:lvl1pPr marL="283487" indent="-283487" algn="l" defTabSz="1133947" rtl="0" eaLnBrk="1" latinLnBrk="0" hangingPunct="1">
@@ -3636,44 +3630,26 @@
             <a:pPr marL="457200" indent="-457200"/>
             <a:r>
               <a:rPr lang="en-GB" dirty="0" smtClean="0"/>
-              <a:t>Be able to manage multiple projects simultaneously</a:t>
-            </a:r>
+              <a:t>Handle large files (4k video footage) </a:t>
+            </a:r>
+            <a:r>
+              <a:rPr lang="en-GB" dirty="0"/>
+              <a:t>and multiple projects</a:t>
+            </a:r>
+            <a:endParaRPr lang="en-GB" dirty="0" smtClean="0"/>
           </a:p>
           <a:p>
             <a:pPr marL="457200" indent="-457200"/>
             <a:r>
               <a:rPr lang="en-GB" dirty="0" smtClean="0"/>
-              <a:t>Handle large files (4k video footage)</a:t>
+              <a:t>Representation as multi-stage pipeline that can be paused at any stage and investigated, to re-do stages with optimized parameters</a:t>
             </a:r>
           </a:p>
           <a:p>
             <a:pPr marL="457200" indent="-457200"/>
             <a:r>
               <a:rPr lang="en-GB" dirty="0" smtClean="0"/>
-              <a:t>Utilize </a:t>
-            </a:r>
-            <a:r>
-              <a:rPr lang="en-GB" dirty="0"/>
-              <a:t>hardware </a:t>
-            </a:r>
-            <a:r>
-              <a:rPr lang="en-GB" dirty="0" smtClean="0"/>
-              <a:t>acceleration for CV and AI (some jobs have specific hardware requirements)</a:t>
-            </a:r>
-          </a:p>
-          <a:p>
-            <a:pPr marL="457200" indent="-457200"/>
-            <a:r>
-              <a:rPr lang="en-GB" dirty="0" smtClean="0"/>
-              <a:t>Provide a </a:t>
-            </a:r>
-            <a:r>
-              <a:rPr lang="en-GB" dirty="0" err="1" smtClean="0"/>
-              <a:t>WebInterface</a:t>
-            </a:r>
-            <a:r>
-              <a:rPr lang="en-GB" dirty="0" smtClean="0"/>
-              <a:t> for the user to manage projects, see job progress and compute node usage</a:t>
+              <a:t>Consider specific hardware requirements for CV and AI</a:t>
             </a:r>
           </a:p>
           <a:p>
@@ -3693,8 +3669,12 @@
           <a:p>
             <a:pPr marL="457200" indent="-457200"/>
             <a:r>
+              <a:rPr lang="en-GB" u="sng" dirty="0"/>
+              <a:t>Decentralized</a:t>
+            </a:r>
+            <a:r>
               <a:rPr lang="en-GB" dirty="0"/>
-              <a:t>Decentralized </a:t>
+              <a:t> </a:t>
             </a:r>
             <a:r>
               <a:rPr lang="en-GB" dirty="0" smtClean="0"/>
@@ -3704,8 +3684,12 @@
           <a:p>
             <a:pPr marL="457200" indent="-457200"/>
             <a:r>
+              <a:rPr lang="en-GB" u="sng" dirty="0" smtClean="0"/>
+              <a:t>Resilient</a:t>
+            </a:r>
+            <a:r>
               <a:rPr lang="en-GB" dirty="0" smtClean="0"/>
-              <a:t>Resilient against node failures</a:t>
+              <a:t> against node failures</a:t>
             </a:r>
           </a:p>
           <a:p>
@@ -3728,37 +3712,6 @@
             <a:r>
               <a:rPr lang="en-GB" dirty="0" smtClean="0"/>
               <a:t>Docker for easy installation of additional compute nodes</a:t>
-            </a:r>
-          </a:p>
-          <a:p>
-            <a:pPr marL="457200" indent="-457200"/>
-            <a:r>
-              <a:rPr lang="en-GB" dirty="0" smtClean="0"/>
-              <a:t>Implementation in Java, using </a:t>
-            </a:r>
-            <a:r>
-              <a:rPr lang="en-GB" dirty="0" err="1" smtClean="0"/>
-              <a:t>SpringBoot</a:t>
-            </a:r>
-            <a:r>
-              <a:rPr lang="en-GB" dirty="0" smtClean="0"/>
-              <a:t> to provide a REST </a:t>
-            </a:r>
-            <a:r>
-              <a:rPr lang="en-GB" dirty="0" err="1" smtClean="0"/>
-              <a:t>Api</a:t>
-            </a:r>
-            <a:r>
-              <a:rPr lang="en-GB" dirty="0" smtClean="0"/>
-              <a:t>, use Typescript and Angular to provide a rich and responsive </a:t>
-            </a:r>
-            <a:r>
-              <a:rPr lang="en-GB" dirty="0" err="1" smtClean="0"/>
-              <a:t>WebInterface</a:t>
-            </a:r>
-            <a:r>
-              <a:rPr lang="en-GB" dirty="0" smtClean="0"/>
-              <a:t> by utilizing the REST API</a:t>
             </a:r>
             <a:endParaRPr lang="en-GB" dirty="0"/>
           </a:p>
@@ -3984,8 +3937,8 @@
         </p:nvSpPr>
         <p:spPr>
           <a:xfrm>
-            <a:off x="1041423" y="15135178"/>
-            <a:ext cx="6706914" cy="5101469"/>
+            <a:off x="1041423" y="15525508"/>
+            <a:ext cx="6706914" cy="4647837"/>
           </a:xfrm>
           <a:prstGeom prst="rect">
             <a:avLst/>
@@ -3993,7 +3946,7 @@
         </p:spPr>
         <p:txBody>
           <a:bodyPr vert="horz" lIns="91440" tIns="45720" rIns="91440" bIns="45720" rtlCol="0">
-            <a:normAutofit fontScale="55000" lnSpcReduction="20000"/>
+            <a:normAutofit fontScale="70000" lnSpcReduction="20000"/>
           </a:bodyPr>
           <a:lstStyle>
             <a:lvl1pPr marL="283487" indent="-283487" algn="l" defTabSz="1133947" rtl="0" eaLnBrk="1" latinLnBrk="0" hangingPunct="1">
@@ -4181,58 +4134,10 @@
             <a:endParaRPr lang="en-GB" dirty="0" smtClean="0"/>
           </a:p>
           <a:p>
-            <a:pPr marL="1024174" lvl="1" indent="-457200"/>
+            <a:pPr marL="457200" indent="-457200"/>
             <a:r>
               <a:rPr lang="en-GB" dirty="0" smtClean="0"/>
-              <a:t>Some require big installation overhead</a:t>
-            </a:r>
-          </a:p>
-          <a:p>
-            <a:pPr marL="1024174" lvl="1" indent="-457200"/>
-            <a:r>
-              <a:rPr lang="en-GB" dirty="0" smtClean="0"/>
-              <a:t>Truly decentralised </a:t>
-            </a:r>
-            <a:r>
-              <a:rPr lang="en-GB" dirty="0" err="1" smtClean="0"/>
-              <a:t>filesystems</a:t>
-            </a:r>
-            <a:r>
-              <a:rPr lang="en-GB" dirty="0" smtClean="0"/>
-              <a:t> are rare</a:t>
-            </a:r>
-          </a:p>
-          <a:p>
-            <a:pPr marL="1024174" lvl="1" indent="-457200"/>
-            <a:r>
-              <a:rPr lang="en-GB" dirty="0" smtClean="0"/>
-              <a:t>Tons of different centralized network </a:t>
-            </a:r>
-            <a:r>
-              <a:rPr lang="en-GB" dirty="0" err="1" smtClean="0"/>
-              <a:t>filesystems</a:t>
-            </a:r>
-            <a:endParaRPr lang="en-GB" dirty="0" smtClean="0"/>
-          </a:p>
-          <a:p>
-            <a:pPr marL="1024174" lvl="1" indent="-457200"/>
-            <a:r>
-              <a:rPr lang="en-GB" dirty="0" smtClean="0"/>
-              <a:t>Some provide site awareness or replication services</a:t>
-            </a:r>
-          </a:p>
-          <a:p>
-            <a:pPr marL="457200" indent="-457200"/>
-            <a:r>
-              <a:rPr lang="en-GB" dirty="0" smtClean="0"/>
-              <a:t>How to manage separate execution history from project and pipeline template</a:t>
-            </a:r>
-          </a:p>
-          <a:p>
-            <a:pPr marL="457200" indent="-457200"/>
-            <a:r>
-              <a:rPr lang="en-GB" dirty="0" smtClean="0"/>
-              <a:t>Can you use a shared </a:t>
+              <a:t>Solely depend on a shared </a:t>
             </a:r>
             <a:r>
               <a:rPr lang="en-GB" dirty="0" err="1" smtClean="0"/>
@@ -4322,8 +4227,8 @@
         </p:nvSpPr>
         <p:spPr>
           <a:xfrm>
-            <a:off x="8286750" y="15135179"/>
-            <a:ext cx="6211085" cy="322535"/>
+            <a:off x="8286750" y="15525508"/>
+            <a:ext cx="6211085" cy="353121"/>
           </a:xfrm>
           <a:prstGeom prst="rect">
             <a:avLst/>
@@ -4331,7 +4236,7 @@
         </p:spPr>
         <p:txBody>
           <a:bodyPr vert="horz" lIns="91440" tIns="45720" rIns="91440" bIns="45720" rtlCol="0">
-            <a:normAutofit fontScale="55000" lnSpcReduction="20000"/>
+            <a:normAutofit fontScale="70000" lnSpcReduction="20000"/>
           </a:bodyPr>
           <a:lstStyle>
             <a:lvl1pPr marL="283487" indent="-283487" algn="l" defTabSz="1133947" rtl="0" eaLnBrk="1" latinLnBrk="0" hangingPunct="1">
@@ -4510,7 +4415,7 @@
       </p:sp>
       <p:pic>
         <p:nvPicPr>
-          <p:cNvPr id="47" name="Grafik 46"/>
+          <p:cNvPr id="48" name="Grafik 47"/>
           <p:cNvPicPr>
             <a:picLocks noChangeAspect="1"/>
           </p:cNvPicPr>
@@ -4530,8 +4435,8 @@
         </p:blipFill>
         <p:spPr>
           <a:xfrm>
-            <a:off x="8286750" y="15732793"/>
-            <a:ext cx="6405543" cy="3270693"/>
+            <a:off x="8199035" y="16240654"/>
+            <a:ext cx="6386514" cy="3932691"/>
           </a:xfrm>
           <a:prstGeom prst="rect">
             <a:avLst/>
@@ -4591,48 +4496,6 @@
           <a:lstStyle/>
           <a:p>
             <a:endParaRPr lang="de-DE"/>
-          </a:p>
-        </p:txBody>
-      </p:sp>
-      <p:sp>
-        <p:nvSpPr>
-          <p:cNvPr id="3" name="Textplatzhalter 2"/>
-          <p:cNvSpPr>
-            <a:spLocks noGrp="1"/>
-          </p:cNvSpPr>
-          <p:nvPr>
-            <p:ph type="body" idx="1"/>
-          </p:nvPr>
-        </p:nvSpPr>
-        <p:spPr/>
-        <p:txBody>
-          <a:bodyPr/>
-          <a:lstStyle/>
-          <a:p>
-            <a:endParaRPr lang="de-DE"/>
-          </a:p>
-        </p:txBody>
-      </p:sp>
-      <p:sp>
-        <p:nvSpPr>
-          <p:cNvPr id="4" name="Inhaltsplatzhalter 3"/>
-          <p:cNvSpPr>
-            <a:spLocks noGrp="1"/>
-          </p:cNvSpPr>
-          <p:nvPr>
-            <p:ph sz="half" idx="2"/>
-          </p:nvPr>
-        </p:nvSpPr>
-        <p:spPr/>
-        <p:txBody>
-          <a:bodyPr/>
-          <a:lstStyle/>
-          <a:p>
-            <a:r>
-              <a:rPr lang="de-DE" dirty="0" err="1" smtClean="0"/>
-              <a:t>abc</a:t>
-            </a:r>
-            <a:endParaRPr lang="de-DE" dirty="0"/>
           </a:p>
         </p:txBody>
       </p:sp>
@@ -5703,6 +5566,344 @@
           </a:prstGeom>
         </p:spPr>
       </p:pic>
+      <p:sp>
+        <p:nvSpPr>
+          <p:cNvPr id="14" name="Inhaltsplatzhalter 3"/>
+          <p:cNvSpPr txBox="1">
+            <a:spLocks/>
+          </p:cNvSpPr>
+          <p:nvPr/>
+        </p:nvSpPr>
+        <p:spPr>
+          <a:xfrm>
+            <a:off x="457980" y="6525866"/>
+            <a:ext cx="6706914" cy="5101469"/>
+          </a:xfrm>
+          <a:prstGeom prst="rect">
+            <a:avLst/>
+          </a:prstGeom>
+        </p:spPr>
+        <p:txBody>
+          <a:bodyPr vert="horz" lIns="91440" tIns="45720" rIns="91440" bIns="45720" rtlCol="0">
+            <a:normAutofit fontScale="55000" lnSpcReduction="20000"/>
+          </a:bodyPr>
+          <a:lstStyle>
+            <a:lvl1pPr marL="283487" indent="-283487" algn="l" defTabSz="1133947" rtl="0" eaLnBrk="1" latinLnBrk="0" hangingPunct="1">
+              <a:lnSpc>
+                <a:spcPct val="90000"/>
+              </a:lnSpc>
+              <a:spcBef>
+                <a:spcPts val="1240"/>
+              </a:spcBef>
+              <a:buFont typeface="Arial" panose="020B0604020202020204" pitchFamily="34" charset="0"/>
+              <a:buChar char="•"/>
+              <a:defRPr sz="3472" kern="1200">
+                <a:solidFill>
+                  <a:schemeClr val="tx1"/>
+                </a:solidFill>
+                <a:latin typeface="+mn-lt"/>
+                <a:ea typeface="+mn-ea"/>
+                <a:cs typeface="+mn-cs"/>
+              </a:defRPr>
+            </a:lvl1pPr>
+            <a:lvl2pPr marL="850461" indent="-283487" algn="l" defTabSz="1133947" rtl="0" eaLnBrk="1" latinLnBrk="0" hangingPunct="1">
+              <a:lnSpc>
+                <a:spcPct val="90000"/>
+              </a:lnSpc>
+              <a:spcBef>
+                <a:spcPts val="620"/>
+              </a:spcBef>
+              <a:buFont typeface="Arial" panose="020B0604020202020204" pitchFamily="34" charset="0"/>
+              <a:buChar char="•"/>
+              <a:defRPr sz="2976" kern="1200">
+                <a:solidFill>
+                  <a:schemeClr val="tx1"/>
+                </a:solidFill>
+                <a:latin typeface="+mn-lt"/>
+                <a:ea typeface="+mn-ea"/>
+                <a:cs typeface="+mn-cs"/>
+              </a:defRPr>
+            </a:lvl2pPr>
+            <a:lvl3pPr marL="1417434" indent="-283487" algn="l" defTabSz="1133947" rtl="0" eaLnBrk="1" latinLnBrk="0" hangingPunct="1">
+              <a:lnSpc>
+                <a:spcPct val="90000"/>
+              </a:lnSpc>
+              <a:spcBef>
+                <a:spcPts val="620"/>
+              </a:spcBef>
+              <a:buFont typeface="Arial" panose="020B0604020202020204" pitchFamily="34" charset="0"/>
+              <a:buChar char="•"/>
+              <a:defRPr sz="2480" kern="1200">
+                <a:solidFill>
+                  <a:schemeClr val="tx1"/>
+                </a:solidFill>
+                <a:latin typeface="+mn-lt"/>
+                <a:ea typeface="+mn-ea"/>
+                <a:cs typeface="+mn-cs"/>
+              </a:defRPr>
+            </a:lvl3pPr>
+            <a:lvl4pPr marL="1984408" indent="-283487" algn="l" defTabSz="1133947" rtl="0" eaLnBrk="1" latinLnBrk="0" hangingPunct="1">
+              <a:lnSpc>
+                <a:spcPct val="90000"/>
+              </a:lnSpc>
+              <a:spcBef>
+                <a:spcPts val="620"/>
+              </a:spcBef>
+              <a:buFont typeface="Arial" panose="020B0604020202020204" pitchFamily="34" charset="0"/>
+              <a:buChar char="•"/>
+              <a:defRPr sz="2232" kern="1200">
+                <a:solidFill>
+                  <a:schemeClr val="tx1"/>
+                </a:solidFill>
+                <a:latin typeface="+mn-lt"/>
+                <a:ea typeface="+mn-ea"/>
+                <a:cs typeface="+mn-cs"/>
+              </a:defRPr>
+            </a:lvl4pPr>
+            <a:lvl5pPr marL="2551382" indent="-283487" algn="l" defTabSz="1133947" rtl="0" eaLnBrk="1" latinLnBrk="0" hangingPunct="1">
+              <a:lnSpc>
+                <a:spcPct val="90000"/>
+              </a:lnSpc>
+              <a:spcBef>
+                <a:spcPts val="620"/>
+              </a:spcBef>
+              <a:buFont typeface="Arial" panose="020B0604020202020204" pitchFamily="34" charset="0"/>
+              <a:buChar char="•"/>
+              <a:defRPr sz="2232" kern="1200">
+                <a:solidFill>
+                  <a:schemeClr val="tx1"/>
+                </a:solidFill>
+                <a:latin typeface="+mn-lt"/>
+                <a:ea typeface="+mn-ea"/>
+                <a:cs typeface="+mn-cs"/>
+              </a:defRPr>
+            </a:lvl5pPr>
+            <a:lvl6pPr marL="3118355" indent="-283487" algn="l" defTabSz="1133947" rtl="0" eaLnBrk="1" latinLnBrk="0" hangingPunct="1">
+              <a:lnSpc>
+                <a:spcPct val="90000"/>
+              </a:lnSpc>
+              <a:spcBef>
+                <a:spcPts val="620"/>
+              </a:spcBef>
+              <a:buFont typeface="Arial" panose="020B0604020202020204" pitchFamily="34" charset="0"/>
+              <a:buChar char="•"/>
+              <a:defRPr sz="2232" kern="1200">
+                <a:solidFill>
+                  <a:schemeClr val="tx1"/>
+                </a:solidFill>
+                <a:latin typeface="+mn-lt"/>
+                <a:ea typeface="+mn-ea"/>
+                <a:cs typeface="+mn-cs"/>
+              </a:defRPr>
+            </a:lvl6pPr>
+            <a:lvl7pPr marL="3685329" indent="-283487" algn="l" defTabSz="1133947" rtl="0" eaLnBrk="1" latinLnBrk="0" hangingPunct="1">
+              <a:lnSpc>
+                <a:spcPct val="90000"/>
+              </a:lnSpc>
+              <a:spcBef>
+                <a:spcPts val="620"/>
+              </a:spcBef>
+              <a:buFont typeface="Arial" panose="020B0604020202020204" pitchFamily="34" charset="0"/>
+              <a:buChar char="•"/>
+              <a:defRPr sz="2232" kern="1200">
+                <a:solidFill>
+                  <a:schemeClr val="tx1"/>
+                </a:solidFill>
+                <a:latin typeface="+mn-lt"/>
+                <a:ea typeface="+mn-ea"/>
+                <a:cs typeface="+mn-cs"/>
+              </a:defRPr>
+            </a:lvl7pPr>
+            <a:lvl8pPr marL="4252303" indent="-283487" algn="l" defTabSz="1133947" rtl="0" eaLnBrk="1" latinLnBrk="0" hangingPunct="1">
+              <a:lnSpc>
+                <a:spcPct val="90000"/>
+              </a:lnSpc>
+              <a:spcBef>
+                <a:spcPts val="620"/>
+              </a:spcBef>
+              <a:buFont typeface="Arial" panose="020B0604020202020204" pitchFamily="34" charset="0"/>
+              <a:buChar char="•"/>
+              <a:defRPr sz="2232" kern="1200">
+                <a:solidFill>
+                  <a:schemeClr val="tx1"/>
+                </a:solidFill>
+                <a:latin typeface="+mn-lt"/>
+                <a:ea typeface="+mn-ea"/>
+                <a:cs typeface="+mn-cs"/>
+              </a:defRPr>
+            </a:lvl8pPr>
+            <a:lvl9pPr marL="4819277" indent="-283487" algn="l" defTabSz="1133947" rtl="0" eaLnBrk="1" latinLnBrk="0" hangingPunct="1">
+              <a:lnSpc>
+                <a:spcPct val="90000"/>
+              </a:lnSpc>
+              <a:spcBef>
+                <a:spcPts val="620"/>
+              </a:spcBef>
+              <a:buFont typeface="Arial" panose="020B0604020202020204" pitchFamily="34" charset="0"/>
+              <a:buChar char="•"/>
+              <a:defRPr sz="2232" kern="1200">
+                <a:solidFill>
+                  <a:schemeClr val="tx1"/>
+                </a:solidFill>
+                <a:latin typeface="+mn-lt"/>
+                <a:ea typeface="+mn-ea"/>
+                <a:cs typeface="+mn-cs"/>
+              </a:defRPr>
+            </a:lvl9pPr>
+          </a:lstStyle>
+          <a:p>
+            <a:pPr marL="0" indent="0">
+              <a:buNone/>
+            </a:pPr>
+            <a:r>
+              <a:rPr lang="en-GB" b="1" dirty="0" smtClean="0"/>
+              <a:t>Challenges and Experimental Work</a:t>
+            </a:r>
+          </a:p>
+          <a:p>
+            <a:pPr marL="457200" indent="-457200"/>
+            <a:r>
+              <a:rPr lang="en-GB" dirty="0" smtClean="0"/>
+              <a:t>Finding a fitting network </a:t>
+            </a:r>
+            <a:r>
+              <a:rPr lang="en-GB" dirty="0" err="1" smtClean="0"/>
+              <a:t>filesystem</a:t>
+            </a:r>
+            <a:endParaRPr lang="en-GB" dirty="0" smtClean="0"/>
+          </a:p>
+          <a:p>
+            <a:pPr marL="1024174" lvl="1" indent="-457200"/>
+            <a:r>
+              <a:rPr lang="en-GB" dirty="0" smtClean="0"/>
+              <a:t>Some require big installation overhead</a:t>
+            </a:r>
+          </a:p>
+          <a:p>
+            <a:pPr marL="1024174" lvl="1" indent="-457200"/>
+            <a:r>
+              <a:rPr lang="en-GB" dirty="0" smtClean="0"/>
+              <a:t>Truly decentralised </a:t>
+            </a:r>
+            <a:r>
+              <a:rPr lang="en-GB" dirty="0" err="1" smtClean="0"/>
+              <a:t>filesystems</a:t>
+            </a:r>
+            <a:r>
+              <a:rPr lang="en-GB" dirty="0" smtClean="0"/>
+              <a:t> are rare</a:t>
+            </a:r>
+          </a:p>
+          <a:p>
+            <a:pPr marL="1024174" lvl="1" indent="-457200"/>
+            <a:r>
+              <a:rPr lang="en-GB" dirty="0" smtClean="0"/>
+              <a:t>Tons of different centralized network </a:t>
+            </a:r>
+            <a:r>
+              <a:rPr lang="en-GB" dirty="0" err="1" smtClean="0"/>
+              <a:t>filesystems</a:t>
+            </a:r>
+            <a:endParaRPr lang="en-GB" dirty="0" smtClean="0"/>
+          </a:p>
+          <a:p>
+            <a:pPr marL="1024174" lvl="1" indent="-457200"/>
+            <a:r>
+              <a:rPr lang="en-GB" dirty="0" smtClean="0"/>
+              <a:t>Some provide site awareness or replication services</a:t>
+            </a:r>
+          </a:p>
+          <a:p>
+            <a:pPr marL="457200" indent="-457200"/>
+            <a:r>
+              <a:rPr lang="en-GB" dirty="0" smtClean="0"/>
+              <a:t>How to manage separate execution history from project and pipeline template</a:t>
+            </a:r>
+          </a:p>
+          <a:p>
+            <a:pPr marL="457200" indent="-457200"/>
+            <a:r>
+              <a:rPr lang="en-GB" dirty="0" smtClean="0"/>
+              <a:t>Can you use a shared </a:t>
+            </a:r>
+            <a:r>
+              <a:rPr lang="en-GB" dirty="0" err="1" smtClean="0"/>
+              <a:t>filesystem</a:t>
+            </a:r>
+            <a:r>
+              <a:rPr lang="en-GB" dirty="0" smtClean="0"/>
+              <a:t> for communication and coordination to strip down external (system) dependencies</a:t>
+            </a:r>
+          </a:p>
+          <a:p>
+            <a:pPr marL="0" indent="0">
+              <a:buNone/>
+            </a:pPr>
+            <a:endParaRPr lang="en-GB" b="1" dirty="0"/>
+          </a:p>
+          <a:p>
+            <a:pPr marL="0" indent="0">
+              <a:buNone/>
+            </a:pPr>
+            <a:r>
+              <a:rPr lang="en-GB" b="1" dirty="0" smtClean="0"/>
+              <a:t>Results</a:t>
+            </a:r>
+          </a:p>
+          <a:p>
+            <a:pPr marL="457200" indent="-457200"/>
+            <a:r>
+              <a:rPr lang="en-GB" dirty="0" smtClean="0"/>
+              <a:t>Synchronous </a:t>
+            </a:r>
+            <a:r>
+              <a:rPr lang="en-GB" dirty="0" err="1" smtClean="0"/>
+              <a:t>EventSystem</a:t>
+            </a:r>
+            <a:r>
+              <a:rPr lang="en-GB" dirty="0" smtClean="0"/>
+              <a:t> with </a:t>
+            </a:r>
+            <a:r>
+              <a:rPr lang="en-GB" dirty="0" err="1" smtClean="0"/>
+              <a:t>Boradcast</a:t>
+            </a:r>
+            <a:r>
+              <a:rPr lang="en-GB" dirty="0" smtClean="0"/>
+              <a:t> functionality based on files on a shared </a:t>
+            </a:r>
+            <a:r>
+              <a:rPr lang="en-GB" dirty="0" err="1" smtClean="0"/>
+              <a:t>filesystem</a:t>
+            </a:r>
+            <a:endParaRPr lang="en-GB" dirty="0" smtClean="0"/>
+          </a:p>
+          <a:p>
+            <a:pPr marL="457200" indent="-457200"/>
+            <a:r>
+              <a:rPr lang="en-GB" dirty="0" smtClean="0"/>
+              <a:t>Implementations of a timeout </a:t>
+            </a:r>
+            <a:r>
+              <a:rPr lang="en-GB" dirty="0" err="1" smtClean="0"/>
+              <a:t>Mutex</a:t>
+            </a:r>
+            <a:r>
+              <a:rPr lang="en-GB" dirty="0" smtClean="0"/>
+              <a:t> on-top of the </a:t>
+            </a:r>
+            <a:r>
+              <a:rPr lang="en-GB" dirty="0" err="1" smtClean="0"/>
+              <a:t>EventSystem</a:t>
+            </a:r>
+            <a:r>
+              <a:rPr lang="en-GB" dirty="0" smtClean="0"/>
+              <a:t> to lock projects throughout the whole system</a:t>
+            </a:r>
+            <a:endParaRPr lang="en-GB" dirty="0"/>
+          </a:p>
+        </p:txBody>
+      </p:sp>
     </p:spTree>
     <p:extLst>
       <p:ext uri="{BB962C8B-B14F-4D97-AF65-F5344CB8AC3E}">

</xml_diff>

<commit_message>
Semi-final version of presentation
</commit_message>
<xml_diff>
--- a/presentation.pptx
+++ b/presentation.pptx
@@ -3354,7 +3354,7 @@
             </a:pPr>
             <a:r>
               <a:rPr lang="en-GB" b="1" dirty="0" smtClean="0"/>
-              <a:t>Project context</a:t>
+              <a:t>Project Context</a:t>
             </a:r>
           </a:p>
           <a:p>
@@ -3423,8 +3423,8 @@
         </p:nvSpPr>
         <p:spPr>
           <a:xfrm>
-            <a:off x="8286750" y="8692557"/>
-            <a:ext cx="6211084" cy="6289895"/>
+            <a:off x="8286750" y="8861727"/>
+            <a:ext cx="6211084" cy="5299214"/>
           </a:xfrm>
           <a:prstGeom prst="rect">
             <a:avLst/>
@@ -3623,13 +3623,6 @@
             <a:pPr marL="457200" indent="-457200"/>
             <a:r>
               <a:rPr lang="en-GB" dirty="0" smtClean="0"/>
-              <a:t>Automatically distribute jobs onto computing nodes</a:t>
-            </a:r>
-          </a:p>
-          <a:p>
-            <a:pPr marL="457200" indent="-457200"/>
-            <a:r>
-              <a:rPr lang="en-GB" dirty="0" smtClean="0"/>
               <a:t>Handle large files (4k video footage) </a:t>
             </a:r>
             <a:r>
@@ -3702,16 +3695,13 @@
               <a:rPr lang="en-GB" dirty="0" err="1" smtClean="0"/>
               <a:t>filesystem</a:t>
             </a:r>
+            <a:endParaRPr lang="en-GB" dirty="0"/>
+          </a:p>
+          <a:p>
+            <a:pPr marL="457200" indent="-457200"/>
             <a:r>
               <a:rPr lang="en-GB" dirty="0" smtClean="0"/>
-              <a:t> for data, configuration and coordination</a:t>
-            </a:r>
-          </a:p>
-          <a:p>
-            <a:pPr marL="457200" indent="-457200"/>
-            <a:r>
-              <a:rPr lang="en-GB" dirty="0" smtClean="0"/>
-              <a:t>Docker for easy installation of additional compute nodes</a:t>
+              <a:t>Docker</a:t>
             </a:r>
             <a:endParaRPr lang="en-GB" dirty="0"/>
           </a:p>
@@ -3937,8 +3927,8 @@
         </p:nvSpPr>
         <p:spPr>
           <a:xfrm>
-            <a:off x="1041423" y="15525508"/>
-            <a:ext cx="6706914" cy="4647837"/>
+            <a:off x="979133" y="16920640"/>
+            <a:ext cx="6824977" cy="2049810"/>
           </a:xfrm>
           <a:prstGeom prst="rect">
             <a:avLst/>
@@ -4118,56 +4108,21 @@
             </a:pPr>
             <a:r>
               <a:rPr lang="en-GB" b="1" dirty="0" smtClean="0"/>
-              <a:t>Challenges and Experimental Work</a:t>
+              <a:t>Results</a:t>
             </a:r>
           </a:p>
           <a:p>
             <a:pPr marL="457200" indent="-457200"/>
             <a:r>
               <a:rPr lang="en-GB" dirty="0" smtClean="0"/>
-              <a:t>Finding a fitting network </a:t>
-            </a:r>
-            <a:r>
-              <a:rPr lang="en-GB" dirty="0" err="1" smtClean="0"/>
-              <a:t>filesystem</a:t>
-            </a:r>
-            <a:endParaRPr lang="en-GB" dirty="0" smtClean="0"/>
+              <a:t>Time savings because of higher hardware utilization due to automatic stage execution</a:t>
+            </a:r>
           </a:p>
           <a:p>
             <a:pPr marL="457200" indent="-457200"/>
             <a:r>
               <a:rPr lang="en-GB" dirty="0" smtClean="0"/>
-              <a:t>Solely depend on a shared </a:t>
-            </a:r>
-            <a:r>
-              <a:rPr lang="en-GB" dirty="0" err="1" smtClean="0"/>
-              <a:t>filesystem</a:t>
-            </a:r>
-            <a:r>
-              <a:rPr lang="en-GB" dirty="0" smtClean="0"/>
-              <a:t> for communication and coordination to strip down external (system) dependencies</a:t>
-            </a:r>
-          </a:p>
-          <a:p>
-            <a:pPr marL="0" indent="0">
-              <a:buNone/>
-            </a:pPr>
-            <a:endParaRPr lang="en-GB" b="1" dirty="0"/>
-          </a:p>
-          <a:p>
-            <a:pPr marL="0" indent="0">
-              <a:buNone/>
-            </a:pPr>
-            <a:r>
-              <a:rPr lang="en-GB" b="1" dirty="0" smtClean="0"/>
-              <a:t>Results</a:t>
-            </a:r>
-          </a:p>
-          <a:p>
-            <a:pPr marL="457200" indent="-457200"/>
-            <a:r>
-              <a:rPr lang="en-GB" dirty="0" smtClean="0"/>
-              <a:t>Synchronous </a:t>
+              <a:t>Creation of a distributed and synchronous </a:t>
             </a:r>
             <a:r>
               <a:rPr lang="en-GB" dirty="0" err="1" smtClean="0"/>
@@ -4175,241 +4130,21 @@
             </a:r>
             <a:r>
               <a:rPr lang="en-GB" dirty="0" smtClean="0"/>
-              <a:t> with </a:t>
+              <a:t> with timeout based </a:t>
             </a:r>
             <a:r>
               <a:rPr lang="en-GB" dirty="0" err="1" smtClean="0"/>
-              <a:t>Boradcast</a:t>
+              <a:t>mutex</a:t>
             </a:r>
             <a:r>
               <a:rPr lang="en-GB" dirty="0" smtClean="0"/>
-              <a:t> functionality based on files on a shared </a:t>
+              <a:t> </a:t>
             </a:r>
             <a:r>
               <a:rPr lang="en-GB" dirty="0" err="1" smtClean="0"/>
-              <a:t>filesystem</a:t>
-            </a:r>
-            <a:endParaRPr lang="en-GB" dirty="0" smtClean="0"/>
-          </a:p>
-          <a:p>
-            <a:pPr marL="457200" indent="-457200"/>
-            <a:r>
-              <a:rPr lang="en-GB" dirty="0" smtClean="0"/>
-              <a:t>Implementations of a timeout </a:t>
-            </a:r>
-            <a:r>
-              <a:rPr lang="en-GB" dirty="0" err="1" smtClean="0"/>
-              <a:t>Mutex</a:t>
-            </a:r>
-            <a:r>
-              <a:rPr lang="en-GB" dirty="0" smtClean="0"/>
-              <a:t> on-top of the </a:t>
-            </a:r>
-            <a:r>
-              <a:rPr lang="en-GB" dirty="0" err="1" smtClean="0"/>
-              <a:t>EventSystem</a:t>
-            </a:r>
-            <a:r>
-              <a:rPr lang="en-GB" dirty="0" smtClean="0"/>
-              <a:t> to lock projects throughout the whole system</a:t>
+              <a:t>ontop</a:t>
             </a:r>
             <a:endParaRPr lang="en-GB" dirty="0"/>
-          </a:p>
-        </p:txBody>
-      </p:sp>
-      <p:sp>
-        <p:nvSpPr>
-          <p:cNvPr id="44" name="Inhaltsplatzhalter 3"/>
-          <p:cNvSpPr txBox="1">
-            <a:spLocks/>
-          </p:cNvSpPr>
-          <p:nvPr/>
-        </p:nvSpPr>
-        <p:spPr>
-          <a:xfrm>
-            <a:off x="8286750" y="15525508"/>
-            <a:ext cx="6211085" cy="353121"/>
-          </a:xfrm>
-          <a:prstGeom prst="rect">
-            <a:avLst/>
-          </a:prstGeom>
-        </p:spPr>
-        <p:txBody>
-          <a:bodyPr vert="horz" lIns="91440" tIns="45720" rIns="91440" bIns="45720" rtlCol="0">
-            <a:normAutofit fontScale="70000" lnSpcReduction="20000"/>
-          </a:bodyPr>
-          <a:lstStyle>
-            <a:lvl1pPr marL="283487" indent="-283487" algn="l" defTabSz="1133947" rtl="0" eaLnBrk="1" latinLnBrk="0" hangingPunct="1">
-              <a:lnSpc>
-                <a:spcPct val="90000"/>
-              </a:lnSpc>
-              <a:spcBef>
-                <a:spcPts val="1240"/>
-              </a:spcBef>
-              <a:buFont typeface="Arial" panose="020B0604020202020204" pitchFamily="34" charset="0"/>
-              <a:buChar char="•"/>
-              <a:defRPr sz="3472" kern="1200">
-                <a:solidFill>
-                  <a:schemeClr val="tx1"/>
-                </a:solidFill>
-                <a:latin typeface="+mn-lt"/>
-                <a:ea typeface="+mn-ea"/>
-                <a:cs typeface="+mn-cs"/>
-              </a:defRPr>
-            </a:lvl1pPr>
-            <a:lvl2pPr marL="850461" indent="-283487" algn="l" defTabSz="1133947" rtl="0" eaLnBrk="1" latinLnBrk="0" hangingPunct="1">
-              <a:lnSpc>
-                <a:spcPct val="90000"/>
-              </a:lnSpc>
-              <a:spcBef>
-                <a:spcPts val="620"/>
-              </a:spcBef>
-              <a:buFont typeface="Arial" panose="020B0604020202020204" pitchFamily="34" charset="0"/>
-              <a:buChar char="•"/>
-              <a:defRPr sz="2976" kern="1200">
-                <a:solidFill>
-                  <a:schemeClr val="tx1"/>
-                </a:solidFill>
-                <a:latin typeface="+mn-lt"/>
-                <a:ea typeface="+mn-ea"/>
-                <a:cs typeface="+mn-cs"/>
-              </a:defRPr>
-            </a:lvl2pPr>
-            <a:lvl3pPr marL="1417434" indent="-283487" algn="l" defTabSz="1133947" rtl="0" eaLnBrk="1" latinLnBrk="0" hangingPunct="1">
-              <a:lnSpc>
-                <a:spcPct val="90000"/>
-              </a:lnSpc>
-              <a:spcBef>
-                <a:spcPts val="620"/>
-              </a:spcBef>
-              <a:buFont typeface="Arial" panose="020B0604020202020204" pitchFamily="34" charset="0"/>
-              <a:buChar char="•"/>
-              <a:defRPr sz="2480" kern="1200">
-                <a:solidFill>
-                  <a:schemeClr val="tx1"/>
-                </a:solidFill>
-                <a:latin typeface="+mn-lt"/>
-                <a:ea typeface="+mn-ea"/>
-                <a:cs typeface="+mn-cs"/>
-              </a:defRPr>
-            </a:lvl3pPr>
-            <a:lvl4pPr marL="1984408" indent="-283487" algn="l" defTabSz="1133947" rtl="0" eaLnBrk="1" latinLnBrk="0" hangingPunct="1">
-              <a:lnSpc>
-                <a:spcPct val="90000"/>
-              </a:lnSpc>
-              <a:spcBef>
-                <a:spcPts val="620"/>
-              </a:spcBef>
-              <a:buFont typeface="Arial" panose="020B0604020202020204" pitchFamily="34" charset="0"/>
-              <a:buChar char="•"/>
-              <a:defRPr sz="2232" kern="1200">
-                <a:solidFill>
-                  <a:schemeClr val="tx1"/>
-                </a:solidFill>
-                <a:latin typeface="+mn-lt"/>
-                <a:ea typeface="+mn-ea"/>
-                <a:cs typeface="+mn-cs"/>
-              </a:defRPr>
-            </a:lvl4pPr>
-            <a:lvl5pPr marL="2551382" indent="-283487" algn="l" defTabSz="1133947" rtl="0" eaLnBrk="1" latinLnBrk="0" hangingPunct="1">
-              <a:lnSpc>
-                <a:spcPct val="90000"/>
-              </a:lnSpc>
-              <a:spcBef>
-                <a:spcPts val="620"/>
-              </a:spcBef>
-              <a:buFont typeface="Arial" panose="020B0604020202020204" pitchFamily="34" charset="0"/>
-              <a:buChar char="•"/>
-              <a:defRPr sz="2232" kern="1200">
-                <a:solidFill>
-                  <a:schemeClr val="tx1"/>
-                </a:solidFill>
-                <a:latin typeface="+mn-lt"/>
-                <a:ea typeface="+mn-ea"/>
-                <a:cs typeface="+mn-cs"/>
-              </a:defRPr>
-            </a:lvl5pPr>
-            <a:lvl6pPr marL="3118355" indent="-283487" algn="l" defTabSz="1133947" rtl="0" eaLnBrk="1" latinLnBrk="0" hangingPunct="1">
-              <a:lnSpc>
-                <a:spcPct val="90000"/>
-              </a:lnSpc>
-              <a:spcBef>
-                <a:spcPts val="620"/>
-              </a:spcBef>
-              <a:buFont typeface="Arial" panose="020B0604020202020204" pitchFamily="34" charset="0"/>
-              <a:buChar char="•"/>
-              <a:defRPr sz="2232" kern="1200">
-                <a:solidFill>
-                  <a:schemeClr val="tx1"/>
-                </a:solidFill>
-                <a:latin typeface="+mn-lt"/>
-                <a:ea typeface="+mn-ea"/>
-                <a:cs typeface="+mn-cs"/>
-              </a:defRPr>
-            </a:lvl6pPr>
-            <a:lvl7pPr marL="3685329" indent="-283487" algn="l" defTabSz="1133947" rtl="0" eaLnBrk="1" latinLnBrk="0" hangingPunct="1">
-              <a:lnSpc>
-                <a:spcPct val="90000"/>
-              </a:lnSpc>
-              <a:spcBef>
-                <a:spcPts val="620"/>
-              </a:spcBef>
-              <a:buFont typeface="Arial" panose="020B0604020202020204" pitchFamily="34" charset="0"/>
-              <a:buChar char="•"/>
-              <a:defRPr sz="2232" kern="1200">
-                <a:solidFill>
-                  <a:schemeClr val="tx1"/>
-                </a:solidFill>
-                <a:latin typeface="+mn-lt"/>
-                <a:ea typeface="+mn-ea"/>
-                <a:cs typeface="+mn-cs"/>
-              </a:defRPr>
-            </a:lvl7pPr>
-            <a:lvl8pPr marL="4252303" indent="-283487" algn="l" defTabSz="1133947" rtl="0" eaLnBrk="1" latinLnBrk="0" hangingPunct="1">
-              <a:lnSpc>
-                <a:spcPct val="90000"/>
-              </a:lnSpc>
-              <a:spcBef>
-                <a:spcPts val="620"/>
-              </a:spcBef>
-              <a:buFont typeface="Arial" panose="020B0604020202020204" pitchFamily="34" charset="0"/>
-              <a:buChar char="•"/>
-              <a:defRPr sz="2232" kern="1200">
-                <a:solidFill>
-                  <a:schemeClr val="tx1"/>
-                </a:solidFill>
-                <a:latin typeface="+mn-lt"/>
-                <a:ea typeface="+mn-ea"/>
-                <a:cs typeface="+mn-cs"/>
-              </a:defRPr>
-            </a:lvl8pPr>
-            <a:lvl9pPr marL="4819277" indent="-283487" algn="l" defTabSz="1133947" rtl="0" eaLnBrk="1" latinLnBrk="0" hangingPunct="1">
-              <a:lnSpc>
-                <a:spcPct val="90000"/>
-              </a:lnSpc>
-              <a:spcBef>
-                <a:spcPts val="620"/>
-              </a:spcBef>
-              <a:buFont typeface="Arial" panose="020B0604020202020204" pitchFamily="34" charset="0"/>
-              <a:buChar char="•"/>
-              <a:defRPr sz="2232" kern="1200">
-                <a:solidFill>
-                  <a:schemeClr val="tx1"/>
-                </a:solidFill>
-                <a:latin typeface="+mn-lt"/>
-                <a:ea typeface="+mn-ea"/>
-                <a:cs typeface="+mn-cs"/>
-              </a:defRPr>
-            </a:lvl9pPr>
-          </a:lstStyle>
-          <a:p>
-            <a:pPr marL="0" indent="0">
-              <a:buNone/>
-            </a:pPr>
-            <a:r>
-              <a:rPr lang="en-GB" b="1" dirty="0" smtClean="0"/>
-              <a:t>Project Progress</a:t>
-            </a:r>
           </a:p>
         </p:txBody>
       </p:sp>
@@ -4435,7 +4170,7 @@
         </p:blipFill>
         <p:spPr>
           <a:xfrm>
-            <a:off x="8199035" y="16240654"/>
+            <a:off x="8286750" y="16634950"/>
             <a:ext cx="6386514" cy="3932691"/>
           </a:xfrm>
           <a:prstGeom prst="rect">
@@ -4443,6 +4178,523 @@
           </a:prstGeom>
         </p:spPr>
       </p:pic>
+      <p:pic>
+        <p:nvPicPr>
+          <p:cNvPr id="49" name="Grafik 48"/>
+          <p:cNvPicPr>
+            <a:picLocks noChangeAspect="1"/>
+          </p:cNvPicPr>
+          <p:nvPr/>
+        </p:nvPicPr>
+        <p:blipFill>
+          <a:blip r:embed="rId9">
+            <a:extLst>
+              <a:ext uri="{28A0092B-C50C-407E-A947-70E740481C1C}">
+                <a14:useLocalDpi xmlns:a14="http://schemas.microsoft.com/office/drawing/2010/main" val="0"/>
+              </a:ext>
+            </a:extLst>
+          </a:blip>
+          <a:stretch>
+            <a:fillRect/>
+          </a:stretch>
+        </p:blipFill>
+        <p:spPr>
+          <a:xfrm>
+            <a:off x="957944" y="19049215"/>
+            <a:ext cx="6916248" cy="1518426"/>
+          </a:xfrm>
+          <a:prstGeom prst="rect">
+            <a:avLst/>
+          </a:prstGeom>
+        </p:spPr>
+      </p:pic>
+      <p:sp>
+        <p:nvSpPr>
+          <p:cNvPr id="52" name="Inhaltsplatzhalter 3"/>
+          <p:cNvSpPr txBox="1">
+            <a:spLocks/>
+          </p:cNvSpPr>
+          <p:nvPr/>
+        </p:nvSpPr>
+        <p:spPr>
+          <a:xfrm>
+            <a:off x="1041422" y="14671096"/>
+            <a:ext cx="6824977" cy="1873648"/>
+          </a:xfrm>
+          <a:prstGeom prst="rect">
+            <a:avLst/>
+          </a:prstGeom>
+        </p:spPr>
+        <p:txBody>
+          <a:bodyPr vert="horz" lIns="91440" tIns="45720" rIns="91440" bIns="45720" rtlCol="0">
+            <a:normAutofit fontScale="70000" lnSpcReduction="20000"/>
+          </a:bodyPr>
+          <a:lstStyle>
+            <a:lvl1pPr marL="283487" indent="-283487" algn="l" defTabSz="1133947" rtl="0" eaLnBrk="1" latinLnBrk="0" hangingPunct="1">
+              <a:lnSpc>
+                <a:spcPct val="90000"/>
+              </a:lnSpc>
+              <a:spcBef>
+                <a:spcPts val="1240"/>
+              </a:spcBef>
+              <a:buFont typeface="Arial" panose="020B0604020202020204" pitchFamily="34" charset="0"/>
+              <a:buChar char="•"/>
+              <a:defRPr sz="3472" kern="1200">
+                <a:solidFill>
+                  <a:schemeClr val="tx1"/>
+                </a:solidFill>
+                <a:latin typeface="+mn-lt"/>
+                <a:ea typeface="+mn-ea"/>
+                <a:cs typeface="+mn-cs"/>
+              </a:defRPr>
+            </a:lvl1pPr>
+            <a:lvl2pPr marL="850461" indent="-283487" algn="l" defTabSz="1133947" rtl="0" eaLnBrk="1" latinLnBrk="0" hangingPunct="1">
+              <a:lnSpc>
+                <a:spcPct val="90000"/>
+              </a:lnSpc>
+              <a:spcBef>
+                <a:spcPts val="620"/>
+              </a:spcBef>
+              <a:buFont typeface="Arial" panose="020B0604020202020204" pitchFamily="34" charset="0"/>
+              <a:buChar char="•"/>
+              <a:defRPr sz="2976" kern="1200">
+                <a:solidFill>
+                  <a:schemeClr val="tx1"/>
+                </a:solidFill>
+                <a:latin typeface="+mn-lt"/>
+                <a:ea typeface="+mn-ea"/>
+                <a:cs typeface="+mn-cs"/>
+              </a:defRPr>
+            </a:lvl2pPr>
+            <a:lvl3pPr marL="1417434" indent="-283487" algn="l" defTabSz="1133947" rtl="0" eaLnBrk="1" latinLnBrk="0" hangingPunct="1">
+              <a:lnSpc>
+                <a:spcPct val="90000"/>
+              </a:lnSpc>
+              <a:spcBef>
+                <a:spcPts val="620"/>
+              </a:spcBef>
+              <a:buFont typeface="Arial" panose="020B0604020202020204" pitchFamily="34" charset="0"/>
+              <a:buChar char="•"/>
+              <a:defRPr sz="2480" kern="1200">
+                <a:solidFill>
+                  <a:schemeClr val="tx1"/>
+                </a:solidFill>
+                <a:latin typeface="+mn-lt"/>
+                <a:ea typeface="+mn-ea"/>
+                <a:cs typeface="+mn-cs"/>
+              </a:defRPr>
+            </a:lvl3pPr>
+            <a:lvl4pPr marL="1984408" indent="-283487" algn="l" defTabSz="1133947" rtl="0" eaLnBrk="1" latinLnBrk="0" hangingPunct="1">
+              <a:lnSpc>
+                <a:spcPct val="90000"/>
+              </a:lnSpc>
+              <a:spcBef>
+                <a:spcPts val="620"/>
+              </a:spcBef>
+              <a:buFont typeface="Arial" panose="020B0604020202020204" pitchFamily="34" charset="0"/>
+              <a:buChar char="•"/>
+              <a:defRPr sz="2232" kern="1200">
+                <a:solidFill>
+                  <a:schemeClr val="tx1"/>
+                </a:solidFill>
+                <a:latin typeface="+mn-lt"/>
+                <a:ea typeface="+mn-ea"/>
+                <a:cs typeface="+mn-cs"/>
+              </a:defRPr>
+            </a:lvl4pPr>
+            <a:lvl5pPr marL="2551382" indent="-283487" algn="l" defTabSz="1133947" rtl="0" eaLnBrk="1" latinLnBrk="0" hangingPunct="1">
+              <a:lnSpc>
+                <a:spcPct val="90000"/>
+              </a:lnSpc>
+              <a:spcBef>
+                <a:spcPts val="620"/>
+              </a:spcBef>
+              <a:buFont typeface="Arial" panose="020B0604020202020204" pitchFamily="34" charset="0"/>
+              <a:buChar char="•"/>
+              <a:defRPr sz="2232" kern="1200">
+                <a:solidFill>
+                  <a:schemeClr val="tx1"/>
+                </a:solidFill>
+                <a:latin typeface="+mn-lt"/>
+                <a:ea typeface="+mn-ea"/>
+                <a:cs typeface="+mn-cs"/>
+              </a:defRPr>
+            </a:lvl5pPr>
+            <a:lvl6pPr marL="3118355" indent="-283487" algn="l" defTabSz="1133947" rtl="0" eaLnBrk="1" latinLnBrk="0" hangingPunct="1">
+              <a:lnSpc>
+                <a:spcPct val="90000"/>
+              </a:lnSpc>
+              <a:spcBef>
+                <a:spcPts val="620"/>
+              </a:spcBef>
+              <a:buFont typeface="Arial" panose="020B0604020202020204" pitchFamily="34" charset="0"/>
+              <a:buChar char="•"/>
+              <a:defRPr sz="2232" kern="1200">
+                <a:solidFill>
+                  <a:schemeClr val="tx1"/>
+                </a:solidFill>
+                <a:latin typeface="+mn-lt"/>
+                <a:ea typeface="+mn-ea"/>
+                <a:cs typeface="+mn-cs"/>
+              </a:defRPr>
+            </a:lvl6pPr>
+            <a:lvl7pPr marL="3685329" indent="-283487" algn="l" defTabSz="1133947" rtl="0" eaLnBrk="1" latinLnBrk="0" hangingPunct="1">
+              <a:lnSpc>
+                <a:spcPct val="90000"/>
+              </a:lnSpc>
+              <a:spcBef>
+                <a:spcPts val="620"/>
+              </a:spcBef>
+              <a:buFont typeface="Arial" panose="020B0604020202020204" pitchFamily="34" charset="0"/>
+              <a:buChar char="•"/>
+              <a:defRPr sz="2232" kern="1200">
+                <a:solidFill>
+                  <a:schemeClr val="tx1"/>
+                </a:solidFill>
+                <a:latin typeface="+mn-lt"/>
+                <a:ea typeface="+mn-ea"/>
+                <a:cs typeface="+mn-cs"/>
+              </a:defRPr>
+            </a:lvl7pPr>
+            <a:lvl8pPr marL="4252303" indent="-283487" algn="l" defTabSz="1133947" rtl="0" eaLnBrk="1" latinLnBrk="0" hangingPunct="1">
+              <a:lnSpc>
+                <a:spcPct val="90000"/>
+              </a:lnSpc>
+              <a:spcBef>
+                <a:spcPts val="620"/>
+              </a:spcBef>
+              <a:buFont typeface="Arial" panose="020B0604020202020204" pitchFamily="34" charset="0"/>
+              <a:buChar char="•"/>
+              <a:defRPr sz="2232" kern="1200">
+                <a:solidFill>
+                  <a:schemeClr val="tx1"/>
+                </a:solidFill>
+                <a:latin typeface="+mn-lt"/>
+                <a:ea typeface="+mn-ea"/>
+                <a:cs typeface="+mn-cs"/>
+              </a:defRPr>
+            </a:lvl8pPr>
+            <a:lvl9pPr marL="4819277" indent="-283487" algn="l" defTabSz="1133947" rtl="0" eaLnBrk="1" latinLnBrk="0" hangingPunct="1">
+              <a:lnSpc>
+                <a:spcPct val="90000"/>
+              </a:lnSpc>
+              <a:spcBef>
+                <a:spcPts val="620"/>
+              </a:spcBef>
+              <a:buFont typeface="Arial" panose="020B0604020202020204" pitchFamily="34" charset="0"/>
+              <a:buChar char="•"/>
+              <a:defRPr sz="2232" kern="1200">
+                <a:solidFill>
+                  <a:schemeClr val="tx1"/>
+                </a:solidFill>
+                <a:latin typeface="+mn-lt"/>
+                <a:ea typeface="+mn-ea"/>
+                <a:cs typeface="+mn-cs"/>
+              </a:defRPr>
+            </a:lvl9pPr>
+          </a:lstStyle>
+          <a:p>
+            <a:pPr marL="0" indent="0">
+              <a:buNone/>
+            </a:pPr>
+            <a:r>
+              <a:rPr lang="en-GB" b="1" dirty="0" smtClean="0"/>
+              <a:t>Challenges and Experimental Work</a:t>
+            </a:r>
+          </a:p>
+          <a:p>
+            <a:pPr marL="457200" indent="-457200"/>
+            <a:r>
+              <a:rPr lang="en-GB" dirty="0" smtClean="0"/>
+              <a:t>Finding a fitting network </a:t>
+            </a:r>
+            <a:r>
+              <a:rPr lang="en-GB" dirty="0" err="1" smtClean="0"/>
+              <a:t>filesystem</a:t>
+            </a:r>
+            <a:endParaRPr lang="en-GB" dirty="0" smtClean="0"/>
+          </a:p>
+          <a:p>
+            <a:pPr marL="457200" indent="-457200"/>
+            <a:r>
+              <a:rPr lang="en-GB" dirty="0" smtClean="0"/>
+              <a:t>Communication and coordination</a:t>
+            </a:r>
+          </a:p>
+          <a:p>
+            <a:pPr marL="457200" indent="-457200"/>
+            <a:r>
+              <a:rPr lang="en-GB" dirty="0" smtClean="0"/>
+              <a:t>Finding the most fitting execution node for a job</a:t>
+            </a:r>
+          </a:p>
+        </p:txBody>
+      </p:sp>
+      <p:sp>
+        <p:nvSpPr>
+          <p:cNvPr id="53" name="Inhaltsplatzhalter 3"/>
+          <p:cNvSpPr txBox="1">
+            <a:spLocks/>
+          </p:cNvSpPr>
+          <p:nvPr/>
+        </p:nvSpPr>
+        <p:spPr>
+          <a:xfrm>
+            <a:off x="8294373" y="15884261"/>
+            <a:ext cx="6824977" cy="363339"/>
+          </a:xfrm>
+          <a:prstGeom prst="rect">
+            <a:avLst/>
+          </a:prstGeom>
+        </p:spPr>
+        <p:txBody>
+          <a:bodyPr vert="horz" lIns="91440" tIns="45720" rIns="91440" bIns="45720" rtlCol="0">
+            <a:normAutofit fontScale="70000" lnSpcReduction="20000"/>
+          </a:bodyPr>
+          <a:lstStyle>
+            <a:lvl1pPr marL="283487" indent="-283487" algn="l" defTabSz="1133947" rtl="0" eaLnBrk="1" latinLnBrk="0" hangingPunct="1">
+              <a:lnSpc>
+                <a:spcPct val="90000"/>
+              </a:lnSpc>
+              <a:spcBef>
+                <a:spcPts val="1240"/>
+              </a:spcBef>
+              <a:buFont typeface="Arial" panose="020B0604020202020204" pitchFamily="34" charset="0"/>
+              <a:buChar char="•"/>
+              <a:defRPr sz="3472" kern="1200">
+                <a:solidFill>
+                  <a:schemeClr val="tx1"/>
+                </a:solidFill>
+                <a:latin typeface="+mn-lt"/>
+                <a:ea typeface="+mn-ea"/>
+                <a:cs typeface="+mn-cs"/>
+              </a:defRPr>
+            </a:lvl1pPr>
+            <a:lvl2pPr marL="850461" indent="-283487" algn="l" defTabSz="1133947" rtl="0" eaLnBrk="1" latinLnBrk="0" hangingPunct="1">
+              <a:lnSpc>
+                <a:spcPct val="90000"/>
+              </a:lnSpc>
+              <a:spcBef>
+                <a:spcPts val="620"/>
+              </a:spcBef>
+              <a:buFont typeface="Arial" panose="020B0604020202020204" pitchFamily="34" charset="0"/>
+              <a:buChar char="•"/>
+              <a:defRPr sz="2976" kern="1200">
+                <a:solidFill>
+                  <a:schemeClr val="tx1"/>
+                </a:solidFill>
+                <a:latin typeface="+mn-lt"/>
+                <a:ea typeface="+mn-ea"/>
+                <a:cs typeface="+mn-cs"/>
+              </a:defRPr>
+            </a:lvl2pPr>
+            <a:lvl3pPr marL="1417434" indent="-283487" algn="l" defTabSz="1133947" rtl="0" eaLnBrk="1" latinLnBrk="0" hangingPunct="1">
+              <a:lnSpc>
+                <a:spcPct val="90000"/>
+              </a:lnSpc>
+              <a:spcBef>
+                <a:spcPts val="620"/>
+              </a:spcBef>
+              <a:buFont typeface="Arial" panose="020B0604020202020204" pitchFamily="34" charset="0"/>
+              <a:buChar char="•"/>
+              <a:defRPr sz="2480" kern="1200">
+                <a:solidFill>
+                  <a:schemeClr val="tx1"/>
+                </a:solidFill>
+                <a:latin typeface="+mn-lt"/>
+                <a:ea typeface="+mn-ea"/>
+                <a:cs typeface="+mn-cs"/>
+              </a:defRPr>
+            </a:lvl3pPr>
+            <a:lvl4pPr marL="1984408" indent="-283487" algn="l" defTabSz="1133947" rtl="0" eaLnBrk="1" latinLnBrk="0" hangingPunct="1">
+              <a:lnSpc>
+                <a:spcPct val="90000"/>
+              </a:lnSpc>
+              <a:spcBef>
+                <a:spcPts val="620"/>
+              </a:spcBef>
+              <a:buFont typeface="Arial" panose="020B0604020202020204" pitchFamily="34" charset="0"/>
+              <a:buChar char="•"/>
+              <a:defRPr sz="2232" kern="1200">
+                <a:solidFill>
+                  <a:schemeClr val="tx1"/>
+                </a:solidFill>
+                <a:latin typeface="+mn-lt"/>
+                <a:ea typeface="+mn-ea"/>
+                <a:cs typeface="+mn-cs"/>
+              </a:defRPr>
+            </a:lvl4pPr>
+            <a:lvl5pPr marL="2551382" indent="-283487" algn="l" defTabSz="1133947" rtl="0" eaLnBrk="1" latinLnBrk="0" hangingPunct="1">
+              <a:lnSpc>
+                <a:spcPct val="90000"/>
+              </a:lnSpc>
+              <a:spcBef>
+                <a:spcPts val="620"/>
+              </a:spcBef>
+              <a:buFont typeface="Arial" panose="020B0604020202020204" pitchFamily="34" charset="0"/>
+              <a:buChar char="•"/>
+              <a:defRPr sz="2232" kern="1200">
+                <a:solidFill>
+                  <a:schemeClr val="tx1"/>
+                </a:solidFill>
+                <a:latin typeface="+mn-lt"/>
+                <a:ea typeface="+mn-ea"/>
+                <a:cs typeface="+mn-cs"/>
+              </a:defRPr>
+            </a:lvl5pPr>
+            <a:lvl6pPr marL="3118355" indent="-283487" algn="l" defTabSz="1133947" rtl="0" eaLnBrk="1" latinLnBrk="0" hangingPunct="1">
+              <a:lnSpc>
+                <a:spcPct val="90000"/>
+              </a:lnSpc>
+              <a:spcBef>
+                <a:spcPts val="620"/>
+              </a:spcBef>
+              <a:buFont typeface="Arial" panose="020B0604020202020204" pitchFamily="34" charset="0"/>
+              <a:buChar char="•"/>
+              <a:defRPr sz="2232" kern="1200">
+                <a:solidFill>
+                  <a:schemeClr val="tx1"/>
+                </a:solidFill>
+                <a:latin typeface="+mn-lt"/>
+                <a:ea typeface="+mn-ea"/>
+                <a:cs typeface="+mn-cs"/>
+              </a:defRPr>
+            </a:lvl6pPr>
+            <a:lvl7pPr marL="3685329" indent="-283487" algn="l" defTabSz="1133947" rtl="0" eaLnBrk="1" latinLnBrk="0" hangingPunct="1">
+              <a:lnSpc>
+                <a:spcPct val="90000"/>
+              </a:lnSpc>
+              <a:spcBef>
+                <a:spcPts val="620"/>
+              </a:spcBef>
+              <a:buFont typeface="Arial" panose="020B0604020202020204" pitchFamily="34" charset="0"/>
+              <a:buChar char="•"/>
+              <a:defRPr sz="2232" kern="1200">
+                <a:solidFill>
+                  <a:schemeClr val="tx1"/>
+                </a:solidFill>
+                <a:latin typeface="+mn-lt"/>
+                <a:ea typeface="+mn-ea"/>
+                <a:cs typeface="+mn-cs"/>
+              </a:defRPr>
+            </a:lvl7pPr>
+            <a:lvl8pPr marL="4252303" indent="-283487" algn="l" defTabSz="1133947" rtl="0" eaLnBrk="1" latinLnBrk="0" hangingPunct="1">
+              <a:lnSpc>
+                <a:spcPct val="90000"/>
+              </a:lnSpc>
+              <a:spcBef>
+                <a:spcPts val="620"/>
+              </a:spcBef>
+              <a:buFont typeface="Arial" panose="020B0604020202020204" pitchFamily="34" charset="0"/>
+              <a:buChar char="•"/>
+              <a:defRPr sz="2232" kern="1200">
+                <a:solidFill>
+                  <a:schemeClr val="tx1"/>
+                </a:solidFill>
+                <a:latin typeface="+mn-lt"/>
+                <a:ea typeface="+mn-ea"/>
+                <a:cs typeface="+mn-cs"/>
+              </a:defRPr>
+            </a:lvl8pPr>
+            <a:lvl9pPr marL="4819277" indent="-283487" algn="l" defTabSz="1133947" rtl="0" eaLnBrk="1" latinLnBrk="0" hangingPunct="1">
+              <a:lnSpc>
+                <a:spcPct val="90000"/>
+              </a:lnSpc>
+              <a:spcBef>
+                <a:spcPts val="620"/>
+              </a:spcBef>
+              <a:buFont typeface="Arial" panose="020B0604020202020204" pitchFamily="34" charset="0"/>
+              <a:buChar char="•"/>
+              <a:defRPr sz="2232" kern="1200">
+                <a:solidFill>
+                  <a:schemeClr val="tx1"/>
+                </a:solidFill>
+                <a:latin typeface="+mn-lt"/>
+                <a:ea typeface="+mn-ea"/>
+                <a:cs typeface="+mn-cs"/>
+              </a:defRPr>
+            </a:lvl9pPr>
+          </a:lstStyle>
+          <a:p>
+            <a:pPr marL="0" indent="0">
+              <a:buNone/>
+            </a:pPr>
+            <a:r>
+              <a:rPr lang="en-GB" b="1" dirty="0" smtClean="0"/>
+              <a:t>Project Progress</a:t>
+            </a:r>
+            <a:endParaRPr lang="en-GB" dirty="0"/>
+          </a:p>
+        </p:txBody>
+      </p:sp>
+      <p:pic>
+        <p:nvPicPr>
+          <p:cNvPr id="54" name="Inhaltsplatzhalter 12"/>
+          <p:cNvPicPr>
+            <a:picLocks noChangeAspect="1"/>
+          </p:cNvPicPr>
+          <p:nvPr/>
+        </p:nvPicPr>
+        <p:blipFill>
+          <a:blip r:embed="rId10" cstate="print">
+            <a:extLst>
+              <a:ext uri="{28A0092B-C50C-407E-A947-70E740481C1C}">
+                <a14:useLocalDpi xmlns:a14="http://schemas.microsoft.com/office/drawing/2010/main" val="0"/>
+              </a:ext>
+            </a:extLst>
+          </a:blip>
+          <a:stretch>
+            <a:fillRect/>
+          </a:stretch>
+        </p:blipFill>
+        <p:spPr>
+          <a:xfrm>
+            <a:off x="12803763" y="13033173"/>
+            <a:ext cx="1694071" cy="2255536"/>
+          </a:xfrm>
+          <a:prstGeom prst="rect">
+            <a:avLst/>
+          </a:prstGeom>
+        </p:spPr>
+      </p:pic>
+      <p:sp>
+        <p:nvSpPr>
+          <p:cNvPr id="55" name="Textfeld 54"/>
+          <p:cNvSpPr txBox="1"/>
+          <p:nvPr/>
+        </p:nvSpPr>
+        <p:spPr>
+          <a:xfrm>
+            <a:off x="11964184" y="15331836"/>
+            <a:ext cx="2533650" cy="584775"/>
+          </a:xfrm>
+          <a:prstGeom prst="rect">
+            <a:avLst/>
+          </a:prstGeom>
+          <a:noFill/>
+        </p:spPr>
+        <p:txBody>
+          <a:bodyPr wrap="square" rtlCol="0">
+            <a:spAutoFit/>
+          </a:bodyPr>
+          <a:lstStyle/>
+          <a:p>
+            <a:pPr algn="r"/>
+            <a:r>
+              <a:rPr lang="de-DE" dirty="0" smtClean="0"/>
+              <a:t>Frederick Winslow Taylor</a:t>
+            </a:r>
+          </a:p>
+          <a:p>
+            <a:pPr algn="r"/>
+            <a:r>
+              <a:rPr lang="de-DE" sz="1400" dirty="0" smtClean="0"/>
+              <a:t>1856 - 1915</a:t>
+            </a:r>
+            <a:endParaRPr lang="de-DE" sz="1400" dirty="0"/>
+          </a:p>
+        </p:txBody>
+      </p:sp>
     </p:spTree>
     <p:extLst>
       <p:ext uri="{BB962C8B-B14F-4D97-AF65-F5344CB8AC3E}">
@@ -4515,994 +4767,6 @@
           <a:lstStyle/>
           <a:p>
             <a:endParaRPr lang="de-DE" dirty="0"/>
-          </a:p>
-        </p:txBody>
-      </p:sp>
-      <p:sp>
-        <p:nvSpPr>
-          <p:cNvPr id="6" name="Inhaltsplatzhalter 5"/>
-          <p:cNvSpPr>
-            <a:spLocks noGrp="1"/>
-          </p:cNvSpPr>
-          <p:nvPr>
-            <p:ph sz="quarter" idx="4"/>
-          </p:nvPr>
-        </p:nvSpPr>
-        <p:spPr/>
-        <p:txBody>
-          <a:bodyPr/>
-          <a:lstStyle/>
-          <a:p>
-            <a:endParaRPr lang="de-DE" dirty="0"/>
-          </a:p>
-        </p:txBody>
-      </p:sp>
-      <p:sp>
-        <p:nvSpPr>
-          <p:cNvPr id="7" name="Textplatzhalter 4"/>
-          <p:cNvSpPr txBox="1">
-            <a:spLocks/>
-          </p:cNvSpPr>
-          <p:nvPr/>
-        </p:nvSpPr>
-        <p:spPr>
-          <a:xfrm>
-            <a:off x="993730" y="12544030"/>
-            <a:ext cx="6396193" cy="2569003"/>
-          </a:xfrm>
-          <a:prstGeom prst="rect">
-            <a:avLst/>
-          </a:prstGeom>
-        </p:spPr>
-        <p:txBody>
-          <a:bodyPr vert="horz" lIns="91440" tIns="45720" rIns="91440" bIns="45720" rtlCol="0" anchor="b">
-            <a:normAutofit/>
-          </a:bodyPr>
-          <a:lstStyle>
-            <a:lvl1pPr marL="0" indent="0" algn="l" defTabSz="1133947" rtl="0" eaLnBrk="1" latinLnBrk="0" hangingPunct="1">
-              <a:lnSpc>
-                <a:spcPct val="90000"/>
-              </a:lnSpc>
-              <a:spcBef>
-                <a:spcPts val="1240"/>
-              </a:spcBef>
-              <a:buFont typeface="Arial" panose="020B0604020202020204" pitchFamily="34" charset="0"/>
-              <a:buNone/>
-              <a:defRPr sz="2976" b="1" kern="1200">
-                <a:solidFill>
-                  <a:schemeClr val="tx1"/>
-                </a:solidFill>
-                <a:latin typeface="+mn-lt"/>
-                <a:ea typeface="+mn-ea"/>
-                <a:cs typeface="+mn-cs"/>
-              </a:defRPr>
-            </a:lvl1pPr>
-            <a:lvl2pPr marL="566974" indent="0" algn="l" defTabSz="1133947" rtl="0" eaLnBrk="1" latinLnBrk="0" hangingPunct="1">
-              <a:lnSpc>
-                <a:spcPct val="90000"/>
-              </a:lnSpc>
-              <a:spcBef>
-                <a:spcPts val="620"/>
-              </a:spcBef>
-              <a:buFont typeface="Arial" panose="020B0604020202020204" pitchFamily="34" charset="0"/>
-              <a:buNone/>
-              <a:defRPr sz="2480" b="1" kern="1200">
-                <a:solidFill>
-                  <a:schemeClr val="tx1"/>
-                </a:solidFill>
-                <a:latin typeface="+mn-lt"/>
-                <a:ea typeface="+mn-ea"/>
-                <a:cs typeface="+mn-cs"/>
-              </a:defRPr>
-            </a:lvl2pPr>
-            <a:lvl3pPr marL="1133947" indent="0" algn="l" defTabSz="1133947" rtl="0" eaLnBrk="1" latinLnBrk="0" hangingPunct="1">
-              <a:lnSpc>
-                <a:spcPct val="90000"/>
-              </a:lnSpc>
-              <a:spcBef>
-                <a:spcPts val="620"/>
-              </a:spcBef>
-              <a:buFont typeface="Arial" panose="020B0604020202020204" pitchFamily="34" charset="0"/>
-              <a:buNone/>
-              <a:defRPr sz="2232" b="1" kern="1200">
-                <a:solidFill>
-                  <a:schemeClr val="tx1"/>
-                </a:solidFill>
-                <a:latin typeface="+mn-lt"/>
-                <a:ea typeface="+mn-ea"/>
-                <a:cs typeface="+mn-cs"/>
-              </a:defRPr>
-            </a:lvl3pPr>
-            <a:lvl4pPr marL="1700921" indent="0" algn="l" defTabSz="1133947" rtl="0" eaLnBrk="1" latinLnBrk="0" hangingPunct="1">
-              <a:lnSpc>
-                <a:spcPct val="90000"/>
-              </a:lnSpc>
-              <a:spcBef>
-                <a:spcPts val="620"/>
-              </a:spcBef>
-              <a:buFont typeface="Arial" panose="020B0604020202020204" pitchFamily="34" charset="0"/>
-              <a:buNone/>
-              <a:defRPr sz="1984" b="1" kern="1200">
-                <a:solidFill>
-                  <a:schemeClr val="tx1"/>
-                </a:solidFill>
-                <a:latin typeface="+mn-lt"/>
-                <a:ea typeface="+mn-ea"/>
-                <a:cs typeface="+mn-cs"/>
-              </a:defRPr>
-            </a:lvl4pPr>
-            <a:lvl5pPr marL="2267895" indent="0" algn="l" defTabSz="1133947" rtl="0" eaLnBrk="1" latinLnBrk="0" hangingPunct="1">
-              <a:lnSpc>
-                <a:spcPct val="90000"/>
-              </a:lnSpc>
-              <a:spcBef>
-                <a:spcPts val="620"/>
-              </a:spcBef>
-              <a:buFont typeface="Arial" panose="020B0604020202020204" pitchFamily="34" charset="0"/>
-              <a:buNone/>
-              <a:defRPr sz="1984" b="1" kern="1200">
-                <a:solidFill>
-                  <a:schemeClr val="tx1"/>
-                </a:solidFill>
-                <a:latin typeface="+mn-lt"/>
-                <a:ea typeface="+mn-ea"/>
-                <a:cs typeface="+mn-cs"/>
-              </a:defRPr>
-            </a:lvl5pPr>
-            <a:lvl6pPr marL="2834869" indent="0" algn="l" defTabSz="1133947" rtl="0" eaLnBrk="1" latinLnBrk="0" hangingPunct="1">
-              <a:lnSpc>
-                <a:spcPct val="90000"/>
-              </a:lnSpc>
-              <a:spcBef>
-                <a:spcPts val="620"/>
-              </a:spcBef>
-              <a:buFont typeface="Arial" panose="020B0604020202020204" pitchFamily="34" charset="0"/>
-              <a:buNone/>
-              <a:defRPr sz="1984" b="1" kern="1200">
-                <a:solidFill>
-                  <a:schemeClr val="tx1"/>
-                </a:solidFill>
-                <a:latin typeface="+mn-lt"/>
-                <a:ea typeface="+mn-ea"/>
-                <a:cs typeface="+mn-cs"/>
-              </a:defRPr>
-            </a:lvl6pPr>
-            <a:lvl7pPr marL="3401842" indent="0" algn="l" defTabSz="1133947" rtl="0" eaLnBrk="1" latinLnBrk="0" hangingPunct="1">
-              <a:lnSpc>
-                <a:spcPct val="90000"/>
-              </a:lnSpc>
-              <a:spcBef>
-                <a:spcPts val="620"/>
-              </a:spcBef>
-              <a:buFont typeface="Arial" panose="020B0604020202020204" pitchFamily="34" charset="0"/>
-              <a:buNone/>
-              <a:defRPr sz="1984" b="1" kern="1200">
-                <a:solidFill>
-                  <a:schemeClr val="tx1"/>
-                </a:solidFill>
-                <a:latin typeface="+mn-lt"/>
-                <a:ea typeface="+mn-ea"/>
-                <a:cs typeface="+mn-cs"/>
-              </a:defRPr>
-            </a:lvl7pPr>
-            <a:lvl8pPr marL="3968816" indent="0" algn="l" defTabSz="1133947" rtl="0" eaLnBrk="1" latinLnBrk="0" hangingPunct="1">
-              <a:lnSpc>
-                <a:spcPct val="90000"/>
-              </a:lnSpc>
-              <a:spcBef>
-                <a:spcPts val="620"/>
-              </a:spcBef>
-              <a:buFont typeface="Arial" panose="020B0604020202020204" pitchFamily="34" charset="0"/>
-              <a:buNone/>
-              <a:defRPr sz="1984" b="1" kern="1200">
-                <a:solidFill>
-                  <a:schemeClr val="tx1"/>
-                </a:solidFill>
-                <a:latin typeface="+mn-lt"/>
-                <a:ea typeface="+mn-ea"/>
-                <a:cs typeface="+mn-cs"/>
-              </a:defRPr>
-            </a:lvl8pPr>
-            <a:lvl9pPr marL="4535790" indent="0" algn="l" defTabSz="1133947" rtl="0" eaLnBrk="1" latinLnBrk="0" hangingPunct="1">
-              <a:lnSpc>
-                <a:spcPct val="90000"/>
-              </a:lnSpc>
-              <a:spcBef>
-                <a:spcPts val="620"/>
-              </a:spcBef>
-              <a:buFont typeface="Arial" panose="020B0604020202020204" pitchFamily="34" charset="0"/>
-              <a:buNone/>
-              <a:defRPr sz="1984" b="1" kern="1200">
-                <a:solidFill>
-                  <a:schemeClr val="tx1"/>
-                </a:solidFill>
-                <a:latin typeface="+mn-lt"/>
-                <a:ea typeface="+mn-ea"/>
-                <a:cs typeface="+mn-cs"/>
-              </a:defRPr>
-            </a:lvl9pPr>
-          </a:lstStyle>
-          <a:p>
-            <a:r>
-              <a:rPr lang="en-GB" dirty="0" smtClean="0"/>
-              <a:t>Project Plan (timeline)</a:t>
-            </a:r>
-            <a:endParaRPr lang="en-GB" dirty="0"/>
-          </a:p>
-        </p:txBody>
-      </p:sp>
-      <p:sp>
-        <p:nvSpPr>
-          <p:cNvPr id="8" name="Textplatzhalter 4"/>
-          <p:cNvSpPr txBox="1">
-            <a:spLocks/>
-          </p:cNvSpPr>
-          <p:nvPr/>
-        </p:nvSpPr>
-        <p:spPr>
-          <a:xfrm>
-            <a:off x="279423" y="14401834"/>
-            <a:ext cx="6396193" cy="2569003"/>
-          </a:xfrm>
-          <a:prstGeom prst="rect">
-            <a:avLst/>
-          </a:prstGeom>
-        </p:spPr>
-        <p:txBody>
-          <a:bodyPr vert="horz" lIns="91440" tIns="45720" rIns="91440" bIns="45720" rtlCol="0" anchor="b">
-            <a:normAutofit/>
-          </a:bodyPr>
-          <a:lstStyle>
-            <a:lvl1pPr marL="0" indent="0" algn="l" defTabSz="1133947" rtl="0" eaLnBrk="1" latinLnBrk="0" hangingPunct="1">
-              <a:lnSpc>
-                <a:spcPct val="90000"/>
-              </a:lnSpc>
-              <a:spcBef>
-                <a:spcPts val="1240"/>
-              </a:spcBef>
-              <a:buFont typeface="Arial" panose="020B0604020202020204" pitchFamily="34" charset="0"/>
-              <a:buNone/>
-              <a:defRPr sz="2976" b="1" kern="1200">
-                <a:solidFill>
-                  <a:schemeClr val="tx1"/>
-                </a:solidFill>
-                <a:latin typeface="+mn-lt"/>
-                <a:ea typeface="+mn-ea"/>
-                <a:cs typeface="+mn-cs"/>
-              </a:defRPr>
-            </a:lvl1pPr>
-            <a:lvl2pPr marL="566974" indent="0" algn="l" defTabSz="1133947" rtl="0" eaLnBrk="1" latinLnBrk="0" hangingPunct="1">
-              <a:lnSpc>
-                <a:spcPct val="90000"/>
-              </a:lnSpc>
-              <a:spcBef>
-                <a:spcPts val="620"/>
-              </a:spcBef>
-              <a:buFont typeface="Arial" panose="020B0604020202020204" pitchFamily="34" charset="0"/>
-              <a:buNone/>
-              <a:defRPr sz="2480" b="1" kern="1200">
-                <a:solidFill>
-                  <a:schemeClr val="tx1"/>
-                </a:solidFill>
-                <a:latin typeface="+mn-lt"/>
-                <a:ea typeface="+mn-ea"/>
-                <a:cs typeface="+mn-cs"/>
-              </a:defRPr>
-            </a:lvl2pPr>
-            <a:lvl3pPr marL="1133947" indent="0" algn="l" defTabSz="1133947" rtl="0" eaLnBrk="1" latinLnBrk="0" hangingPunct="1">
-              <a:lnSpc>
-                <a:spcPct val="90000"/>
-              </a:lnSpc>
-              <a:spcBef>
-                <a:spcPts val="620"/>
-              </a:spcBef>
-              <a:buFont typeface="Arial" panose="020B0604020202020204" pitchFamily="34" charset="0"/>
-              <a:buNone/>
-              <a:defRPr sz="2232" b="1" kern="1200">
-                <a:solidFill>
-                  <a:schemeClr val="tx1"/>
-                </a:solidFill>
-                <a:latin typeface="+mn-lt"/>
-                <a:ea typeface="+mn-ea"/>
-                <a:cs typeface="+mn-cs"/>
-              </a:defRPr>
-            </a:lvl3pPr>
-            <a:lvl4pPr marL="1700921" indent="0" algn="l" defTabSz="1133947" rtl="0" eaLnBrk="1" latinLnBrk="0" hangingPunct="1">
-              <a:lnSpc>
-                <a:spcPct val="90000"/>
-              </a:lnSpc>
-              <a:spcBef>
-                <a:spcPts val="620"/>
-              </a:spcBef>
-              <a:buFont typeface="Arial" panose="020B0604020202020204" pitchFamily="34" charset="0"/>
-              <a:buNone/>
-              <a:defRPr sz="1984" b="1" kern="1200">
-                <a:solidFill>
-                  <a:schemeClr val="tx1"/>
-                </a:solidFill>
-                <a:latin typeface="+mn-lt"/>
-                <a:ea typeface="+mn-ea"/>
-                <a:cs typeface="+mn-cs"/>
-              </a:defRPr>
-            </a:lvl4pPr>
-            <a:lvl5pPr marL="2267895" indent="0" algn="l" defTabSz="1133947" rtl="0" eaLnBrk="1" latinLnBrk="0" hangingPunct="1">
-              <a:lnSpc>
-                <a:spcPct val="90000"/>
-              </a:lnSpc>
-              <a:spcBef>
-                <a:spcPts val="620"/>
-              </a:spcBef>
-              <a:buFont typeface="Arial" panose="020B0604020202020204" pitchFamily="34" charset="0"/>
-              <a:buNone/>
-              <a:defRPr sz="1984" b="1" kern="1200">
-                <a:solidFill>
-                  <a:schemeClr val="tx1"/>
-                </a:solidFill>
-                <a:latin typeface="+mn-lt"/>
-                <a:ea typeface="+mn-ea"/>
-                <a:cs typeface="+mn-cs"/>
-              </a:defRPr>
-            </a:lvl5pPr>
-            <a:lvl6pPr marL="2834869" indent="0" algn="l" defTabSz="1133947" rtl="0" eaLnBrk="1" latinLnBrk="0" hangingPunct="1">
-              <a:lnSpc>
-                <a:spcPct val="90000"/>
-              </a:lnSpc>
-              <a:spcBef>
-                <a:spcPts val="620"/>
-              </a:spcBef>
-              <a:buFont typeface="Arial" panose="020B0604020202020204" pitchFamily="34" charset="0"/>
-              <a:buNone/>
-              <a:defRPr sz="1984" b="1" kern="1200">
-                <a:solidFill>
-                  <a:schemeClr val="tx1"/>
-                </a:solidFill>
-                <a:latin typeface="+mn-lt"/>
-                <a:ea typeface="+mn-ea"/>
-                <a:cs typeface="+mn-cs"/>
-              </a:defRPr>
-            </a:lvl6pPr>
-            <a:lvl7pPr marL="3401842" indent="0" algn="l" defTabSz="1133947" rtl="0" eaLnBrk="1" latinLnBrk="0" hangingPunct="1">
-              <a:lnSpc>
-                <a:spcPct val="90000"/>
-              </a:lnSpc>
-              <a:spcBef>
-                <a:spcPts val="620"/>
-              </a:spcBef>
-              <a:buFont typeface="Arial" panose="020B0604020202020204" pitchFamily="34" charset="0"/>
-              <a:buNone/>
-              <a:defRPr sz="1984" b="1" kern="1200">
-                <a:solidFill>
-                  <a:schemeClr val="tx1"/>
-                </a:solidFill>
-                <a:latin typeface="+mn-lt"/>
-                <a:ea typeface="+mn-ea"/>
-                <a:cs typeface="+mn-cs"/>
-              </a:defRPr>
-            </a:lvl7pPr>
-            <a:lvl8pPr marL="3968816" indent="0" algn="l" defTabSz="1133947" rtl="0" eaLnBrk="1" latinLnBrk="0" hangingPunct="1">
-              <a:lnSpc>
-                <a:spcPct val="90000"/>
-              </a:lnSpc>
-              <a:spcBef>
-                <a:spcPts val="620"/>
-              </a:spcBef>
-              <a:buFont typeface="Arial" panose="020B0604020202020204" pitchFamily="34" charset="0"/>
-              <a:buNone/>
-              <a:defRPr sz="1984" b="1" kern="1200">
-                <a:solidFill>
-                  <a:schemeClr val="tx1"/>
-                </a:solidFill>
-                <a:latin typeface="+mn-lt"/>
-                <a:ea typeface="+mn-ea"/>
-                <a:cs typeface="+mn-cs"/>
-              </a:defRPr>
-            </a:lvl8pPr>
-            <a:lvl9pPr marL="4535790" indent="0" algn="l" defTabSz="1133947" rtl="0" eaLnBrk="1" latinLnBrk="0" hangingPunct="1">
-              <a:lnSpc>
-                <a:spcPct val="90000"/>
-              </a:lnSpc>
-              <a:spcBef>
-                <a:spcPts val="620"/>
-              </a:spcBef>
-              <a:buFont typeface="Arial" panose="020B0604020202020204" pitchFamily="34" charset="0"/>
-              <a:buNone/>
-              <a:defRPr sz="1984" b="1" kern="1200">
-                <a:solidFill>
-                  <a:schemeClr val="tx1"/>
-                </a:solidFill>
-                <a:latin typeface="+mn-lt"/>
-                <a:ea typeface="+mn-ea"/>
-                <a:cs typeface="+mn-cs"/>
-              </a:defRPr>
-            </a:lvl9pPr>
-          </a:lstStyle>
-          <a:p>
-            <a:r>
-              <a:rPr lang="en-GB" dirty="0" smtClean="0"/>
-              <a:t>Description of experimental work</a:t>
-            </a:r>
-          </a:p>
-        </p:txBody>
-      </p:sp>
-      <p:sp>
-        <p:nvSpPr>
-          <p:cNvPr id="9" name="Textplatzhalter 4"/>
-          <p:cNvSpPr txBox="1">
-            <a:spLocks/>
-          </p:cNvSpPr>
-          <p:nvPr/>
-        </p:nvSpPr>
-        <p:spPr>
-          <a:xfrm>
-            <a:off x="1041424" y="11730083"/>
-            <a:ext cx="6396193" cy="2569003"/>
-          </a:xfrm>
-          <a:prstGeom prst="rect">
-            <a:avLst/>
-          </a:prstGeom>
-        </p:spPr>
-        <p:txBody>
-          <a:bodyPr vert="horz" lIns="91440" tIns="45720" rIns="91440" bIns="45720" rtlCol="0" anchor="b">
-            <a:normAutofit/>
-          </a:bodyPr>
-          <a:lstStyle>
-            <a:lvl1pPr marL="0" indent="0" algn="l" defTabSz="1133947" rtl="0" eaLnBrk="1" latinLnBrk="0" hangingPunct="1">
-              <a:lnSpc>
-                <a:spcPct val="90000"/>
-              </a:lnSpc>
-              <a:spcBef>
-                <a:spcPts val="1240"/>
-              </a:spcBef>
-              <a:buFont typeface="Arial" panose="020B0604020202020204" pitchFamily="34" charset="0"/>
-              <a:buNone/>
-              <a:defRPr sz="2976" b="1" kern="1200">
-                <a:solidFill>
-                  <a:schemeClr val="tx1"/>
-                </a:solidFill>
-                <a:latin typeface="+mn-lt"/>
-                <a:ea typeface="+mn-ea"/>
-                <a:cs typeface="+mn-cs"/>
-              </a:defRPr>
-            </a:lvl1pPr>
-            <a:lvl2pPr marL="566974" indent="0" algn="l" defTabSz="1133947" rtl="0" eaLnBrk="1" latinLnBrk="0" hangingPunct="1">
-              <a:lnSpc>
-                <a:spcPct val="90000"/>
-              </a:lnSpc>
-              <a:spcBef>
-                <a:spcPts val="620"/>
-              </a:spcBef>
-              <a:buFont typeface="Arial" panose="020B0604020202020204" pitchFamily="34" charset="0"/>
-              <a:buNone/>
-              <a:defRPr sz="2480" b="1" kern="1200">
-                <a:solidFill>
-                  <a:schemeClr val="tx1"/>
-                </a:solidFill>
-                <a:latin typeface="+mn-lt"/>
-                <a:ea typeface="+mn-ea"/>
-                <a:cs typeface="+mn-cs"/>
-              </a:defRPr>
-            </a:lvl2pPr>
-            <a:lvl3pPr marL="1133947" indent="0" algn="l" defTabSz="1133947" rtl="0" eaLnBrk="1" latinLnBrk="0" hangingPunct="1">
-              <a:lnSpc>
-                <a:spcPct val="90000"/>
-              </a:lnSpc>
-              <a:spcBef>
-                <a:spcPts val="620"/>
-              </a:spcBef>
-              <a:buFont typeface="Arial" panose="020B0604020202020204" pitchFamily="34" charset="0"/>
-              <a:buNone/>
-              <a:defRPr sz="2232" b="1" kern="1200">
-                <a:solidFill>
-                  <a:schemeClr val="tx1"/>
-                </a:solidFill>
-                <a:latin typeface="+mn-lt"/>
-                <a:ea typeface="+mn-ea"/>
-                <a:cs typeface="+mn-cs"/>
-              </a:defRPr>
-            </a:lvl3pPr>
-            <a:lvl4pPr marL="1700921" indent="0" algn="l" defTabSz="1133947" rtl="0" eaLnBrk="1" latinLnBrk="0" hangingPunct="1">
-              <a:lnSpc>
-                <a:spcPct val="90000"/>
-              </a:lnSpc>
-              <a:spcBef>
-                <a:spcPts val="620"/>
-              </a:spcBef>
-              <a:buFont typeface="Arial" panose="020B0604020202020204" pitchFamily="34" charset="0"/>
-              <a:buNone/>
-              <a:defRPr sz="1984" b="1" kern="1200">
-                <a:solidFill>
-                  <a:schemeClr val="tx1"/>
-                </a:solidFill>
-                <a:latin typeface="+mn-lt"/>
-                <a:ea typeface="+mn-ea"/>
-                <a:cs typeface="+mn-cs"/>
-              </a:defRPr>
-            </a:lvl4pPr>
-            <a:lvl5pPr marL="2267895" indent="0" algn="l" defTabSz="1133947" rtl="0" eaLnBrk="1" latinLnBrk="0" hangingPunct="1">
-              <a:lnSpc>
-                <a:spcPct val="90000"/>
-              </a:lnSpc>
-              <a:spcBef>
-                <a:spcPts val="620"/>
-              </a:spcBef>
-              <a:buFont typeface="Arial" panose="020B0604020202020204" pitchFamily="34" charset="0"/>
-              <a:buNone/>
-              <a:defRPr sz="1984" b="1" kern="1200">
-                <a:solidFill>
-                  <a:schemeClr val="tx1"/>
-                </a:solidFill>
-                <a:latin typeface="+mn-lt"/>
-                <a:ea typeface="+mn-ea"/>
-                <a:cs typeface="+mn-cs"/>
-              </a:defRPr>
-            </a:lvl5pPr>
-            <a:lvl6pPr marL="2834869" indent="0" algn="l" defTabSz="1133947" rtl="0" eaLnBrk="1" latinLnBrk="0" hangingPunct="1">
-              <a:lnSpc>
-                <a:spcPct val="90000"/>
-              </a:lnSpc>
-              <a:spcBef>
-                <a:spcPts val="620"/>
-              </a:spcBef>
-              <a:buFont typeface="Arial" panose="020B0604020202020204" pitchFamily="34" charset="0"/>
-              <a:buNone/>
-              <a:defRPr sz="1984" b="1" kern="1200">
-                <a:solidFill>
-                  <a:schemeClr val="tx1"/>
-                </a:solidFill>
-                <a:latin typeface="+mn-lt"/>
-                <a:ea typeface="+mn-ea"/>
-                <a:cs typeface="+mn-cs"/>
-              </a:defRPr>
-            </a:lvl6pPr>
-            <a:lvl7pPr marL="3401842" indent="0" algn="l" defTabSz="1133947" rtl="0" eaLnBrk="1" latinLnBrk="0" hangingPunct="1">
-              <a:lnSpc>
-                <a:spcPct val="90000"/>
-              </a:lnSpc>
-              <a:spcBef>
-                <a:spcPts val="620"/>
-              </a:spcBef>
-              <a:buFont typeface="Arial" panose="020B0604020202020204" pitchFamily="34" charset="0"/>
-              <a:buNone/>
-              <a:defRPr sz="1984" b="1" kern="1200">
-                <a:solidFill>
-                  <a:schemeClr val="tx1"/>
-                </a:solidFill>
-                <a:latin typeface="+mn-lt"/>
-                <a:ea typeface="+mn-ea"/>
-                <a:cs typeface="+mn-cs"/>
-              </a:defRPr>
-            </a:lvl7pPr>
-            <a:lvl8pPr marL="3968816" indent="0" algn="l" defTabSz="1133947" rtl="0" eaLnBrk="1" latinLnBrk="0" hangingPunct="1">
-              <a:lnSpc>
-                <a:spcPct val="90000"/>
-              </a:lnSpc>
-              <a:spcBef>
-                <a:spcPts val="620"/>
-              </a:spcBef>
-              <a:buFont typeface="Arial" panose="020B0604020202020204" pitchFamily="34" charset="0"/>
-              <a:buNone/>
-              <a:defRPr sz="1984" b="1" kern="1200">
-                <a:solidFill>
-                  <a:schemeClr val="tx1"/>
-                </a:solidFill>
-                <a:latin typeface="+mn-lt"/>
-                <a:ea typeface="+mn-ea"/>
-                <a:cs typeface="+mn-cs"/>
-              </a:defRPr>
-            </a:lvl8pPr>
-            <a:lvl9pPr marL="4535790" indent="0" algn="l" defTabSz="1133947" rtl="0" eaLnBrk="1" latinLnBrk="0" hangingPunct="1">
-              <a:lnSpc>
-                <a:spcPct val="90000"/>
-              </a:lnSpc>
-              <a:spcBef>
-                <a:spcPts val="620"/>
-              </a:spcBef>
-              <a:buFont typeface="Arial" panose="020B0604020202020204" pitchFamily="34" charset="0"/>
-              <a:buNone/>
-              <a:defRPr sz="1984" b="1" kern="1200">
-                <a:solidFill>
-                  <a:schemeClr val="tx1"/>
-                </a:solidFill>
-                <a:latin typeface="+mn-lt"/>
-                <a:ea typeface="+mn-ea"/>
-                <a:cs typeface="+mn-cs"/>
-              </a:defRPr>
-            </a:lvl9pPr>
-          </a:lstStyle>
-          <a:p>
-            <a:r>
-              <a:rPr lang="en-GB" dirty="0" smtClean="0"/>
-              <a:t>Results, Evaluation and Analysis of the experimental work</a:t>
-            </a:r>
-            <a:endParaRPr lang="en-GB" dirty="0"/>
-          </a:p>
-        </p:txBody>
-      </p:sp>
-      <p:sp>
-        <p:nvSpPr>
-          <p:cNvPr id="10" name="Textplatzhalter 4"/>
-          <p:cNvSpPr txBox="1">
-            <a:spLocks/>
-          </p:cNvSpPr>
-          <p:nvPr/>
-        </p:nvSpPr>
-        <p:spPr>
-          <a:xfrm>
-            <a:off x="202223" y="14981536"/>
-            <a:ext cx="6396193" cy="2569003"/>
-          </a:xfrm>
-          <a:prstGeom prst="rect">
-            <a:avLst/>
-          </a:prstGeom>
-        </p:spPr>
-        <p:txBody>
-          <a:bodyPr vert="horz" lIns="91440" tIns="45720" rIns="91440" bIns="45720" rtlCol="0" anchor="b">
-            <a:normAutofit/>
-          </a:bodyPr>
-          <a:lstStyle>
-            <a:lvl1pPr marL="0" indent="0" algn="l" defTabSz="1133947" rtl="0" eaLnBrk="1" latinLnBrk="0" hangingPunct="1">
-              <a:lnSpc>
-                <a:spcPct val="90000"/>
-              </a:lnSpc>
-              <a:spcBef>
-                <a:spcPts val="1240"/>
-              </a:spcBef>
-              <a:buFont typeface="Arial" panose="020B0604020202020204" pitchFamily="34" charset="0"/>
-              <a:buNone/>
-              <a:defRPr sz="2976" b="1" kern="1200">
-                <a:solidFill>
-                  <a:schemeClr val="tx1"/>
-                </a:solidFill>
-                <a:latin typeface="+mn-lt"/>
-                <a:ea typeface="+mn-ea"/>
-                <a:cs typeface="+mn-cs"/>
-              </a:defRPr>
-            </a:lvl1pPr>
-            <a:lvl2pPr marL="566974" indent="0" algn="l" defTabSz="1133947" rtl="0" eaLnBrk="1" latinLnBrk="0" hangingPunct="1">
-              <a:lnSpc>
-                <a:spcPct val="90000"/>
-              </a:lnSpc>
-              <a:spcBef>
-                <a:spcPts val="620"/>
-              </a:spcBef>
-              <a:buFont typeface="Arial" panose="020B0604020202020204" pitchFamily="34" charset="0"/>
-              <a:buNone/>
-              <a:defRPr sz="2480" b="1" kern="1200">
-                <a:solidFill>
-                  <a:schemeClr val="tx1"/>
-                </a:solidFill>
-                <a:latin typeface="+mn-lt"/>
-                <a:ea typeface="+mn-ea"/>
-                <a:cs typeface="+mn-cs"/>
-              </a:defRPr>
-            </a:lvl2pPr>
-            <a:lvl3pPr marL="1133947" indent="0" algn="l" defTabSz="1133947" rtl="0" eaLnBrk="1" latinLnBrk="0" hangingPunct="1">
-              <a:lnSpc>
-                <a:spcPct val="90000"/>
-              </a:lnSpc>
-              <a:spcBef>
-                <a:spcPts val="620"/>
-              </a:spcBef>
-              <a:buFont typeface="Arial" panose="020B0604020202020204" pitchFamily="34" charset="0"/>
-              <a:buNone/>
-              <a:defRPr sz="2232" b="1" kern="1200">
-                <a:solidFill>
-                  <a:schemeClr val="tx1"/>
-                </a:solidFill>
-                <a:latin typeface="+mn-lt"/>
-                <a:ea typeface="+mn-ea"/>
-                <a:cs typeface="+mn-cs"/>
-              </a:defRPr>
-            </a:lvl3pPr>
-            <a:lvl4pPr marL="1700921" indent="0" algn="l" defTabSz="1133947" rtl="0" eaLnBrk="1" latinLnBrk="0" hangingPunct="1">
-              <a:lnSpc>
-                <a:spcPct val="90000"/>
-              </a:lnSpc>
-              <a:spcBef>
-                <a:spcPts val="620"/>
-              </a:spcBef>
-              <a:buFont typeface="Arial" panose="020B0604020202020204" pitchFamily="34" charset="0"/>
-              <a:buNone/>
-              <a:defRPr sz="1984" b="1" kern="1200">
-                <a:solidFill>
-                  <a:schemeClr val="tx1"/>
-                </a:solidFill>
-                <a:latin typeface="+mn-lt"/>
-                <a:ea typeface="+mn-ea"/>
-                <a:cs typeface="+mn-cs"/>
-              </a:defRPr>
-            </a:lvl4pPr>
-            <a:lvl5pPr marL="2267895" indent="0" algn="l" defTabSz="1133947" rtl="0" eaLnBrk="1" latinLnBrk="0" hangingPunct="1">
-              <a:lnSpc>
-                <a:spcPct val="90000"/>
-              </a:lnSpc>
-              <a:spcBef>
-                <a:spcPts val="620"/>
-              </a:spcBef>
-              <a:buFont typeface="Arial" panose="020B0604020202020204" pitchFamily="34" charset="0"/>
-              <a:buNone/>
-              <a:defRPr sz="1984" b="1" kern="1200">
-                <a:solidFill>
-                  <a:schemeClr val="tx1"/>
-                </a:solidFill>
-                <a:latin typeface="+mn-lt"/>
-                <a:ea typeface="+mn-ea"/>
-                <a:cs typeface="+mn-cs"/>
-              </a:defRPr>
-            </a:lvl5pPr>
-            <a:lvl6pPr marL="2834869" indent="0" algn="l" defTabSz="1133947" rtl="0" eaLnBrk="1" latinLnBrk="0" hangingPunct="1">
-              <a:lnSpc>
-                <a:spcPct val="90000"/>
-              </a:lnSpc>
-              <a:spcBef>
-                <a:spcPts val="620"/>
-              </a:spcBef>
-              <a:buFont typeface="Arial" panose="020B0604020202020204" pitchFamily="34" charset="0"/>
-              <a:buNone/>
-              <a:defRPr sz="1984" b="1" kern="1200">
-                <a:solidFill>
-                  <a:schemeClr val="tx1"/>
-                </a:solidFill>
-                <a:latin typeface="+mn-lt"/>
-                <a:ea typeface="+mn-ea"/>
-                <a:cs typeface="+mn-cs"/>
-              </a:defRPr>
-            </a:lvl6pPr>
-            <a:lvl7pPr marL="3401842" indent="0" algn="l" defTabSz="1133947" rtl="0" eaLnBrk="1" latinLnBrk="0" hangingPunct="1">
-              <a:lnSpc>
-                <a:spcPct val="90000"/>
-              </a:lnSpc>
-              <a:spcBef>
-                <a:spcPts val="620"/>
-              </a:spcBef>
-              <a:buFont typeface="Arial" panose="020B0604020202020204" pitchFamily="34" charset="0"/>
-              <a:buNone/>
-              <a:defRPr sz="1984" b="1" kern="1200">
-                <a:solidFill>
-                  <a:schemeClr val="tx1"/>
-                </a:solidFill>
-                <a:latin typeface="+mn-lt"/>
-                <a:ea typeface="+mn-ea"/>
-                <a:cs typeface="+mn-cs"/>
-              </a:defRPr>
-            </a:lvl7pPr>
-            <a:lvl8pPr marL="3968816" indent="0" algn="l" defTabSz="1133947" rtl="0" eaLnBrk="1" latinLnBrk="0" hangingPunct="1">
-              <a:lnSpc>
-                <a:spcPct val="90000"/>
-              </a:lnSpc>
-              <a:spcBef>
-                <a:spcPts val="620"/>
-              </a:spcBef>
-              <a:buFont typeface="Arial" panose="020B0604020202020204" pitchFamily="34" charset="0"/>
-              <a:buNone/>
-              <a:defRPr sz="1984" b="1" kern="1200">
-                <a:solidFill>
-                  <a:schemeClr val="tx1"/>
-                </a:solidFill>
-                <a:latin typeface="+mn-lt"/>
-                <a:ea typeface="+mn-ea"/>
-                <a:cs typeface="+mn-cs"/>
-              </a:defRPr>
-            </a:lvl8pPr>
-            <a:lvl9pPr marL="4535790" indent="0" algn="l" defTabSz="1133947" rtl="0" eaLnBrk="1" latinLnBrk="0" hangingPunct="1">
-              <a:lnSpc>
-                <a:spcPct val="90000"/>
-              </a:lnSpc>
-              <a:spcBef>
-                <a:spcPts val="620"/>
-              </a:spcBef>
-              <a:buFont typeface="Arial" panose="020B0604020202020204" pitchFamily="34" charset="0"/>
-              <a:buNone/>
-              <a:defRPr sz="1984" b="1" kern="1200">
-                <a:solidFill>
-                  <a:schemeClr val="tx1"/>
-                </a:solidFill>
-                <a:latin typeface="+mn-lt"/>
-                <a:ea typeface="+mn-ea"/>
-                <a:cs typeface="+mn-cs"/>
-              </a:defRPr>
-            </a:lvl9pPr>
-          </a:lstStyle>
-          <a:p>
-            <a:r>
-              <a:rPr lang="en-GB" smtClean="0"/>
-              <a:t>Conclusion</a:t>
-            </a:r>
-            <a:endParaRPr lang="en-GB" dirty="0"/>
-          </a:p>
-        </p:txBody>
-      </p:sp>
-      <p:sp>
-        <p:nvSpPr>
-          <p:cNvPr id="11" name="Textplatzhalter 4"/>
-          <p:cNvSpPr txBox="1">
-            <a:spLocks/>
-          </p:cNvSpPr>
-          <p:nvPr/>
-        </p:nvSpPr>
-        <p:spPr>
-          <a:xfrm>
-            <a:off x="279424" y="13357977"/>
-            <a:ext cx="6396193" cy="2569003"/>
-          </a:xfrm>
-          <a:prstGeom prst="rect">
-            <a:avLst/>
-          </a:prstGeom>
-        </p:spPr>
-        <p:txBody>
-          <a:bodyPr vert="horz" lIns="91440" tIns="45720" rIns="91440" bIns="45720" rtlCol="0" anchor="b">
-            <a:normAutofit/>
-          </a:bodyPr>
-          <a:lstStyle>
-            <a:lvl1pPr marL="0" indent="0" algn="l" defTabSz="1133947" rtl="0" eaLnBrk="1" latinLnBrk="0" hangingPunct="1">
-              <a:lnSpc>
-                <a:spcPct val="90000"/>
-              </a:lnSpc>
-              <a:spcBef>
-                <a:spcPts val="1240"/>
-              </a:spcBef>
-              <a:buFont typeface="Arial" panose="020B0604020202020204" pitchFamily="34" charset="0"/>
-              <a:buNone/>
-              <a:defRPr sz="2976" b="1" kern="1200">
-                <a:solidFill>
-                  <a:schemeClr val="tx1"/>
-                </a:solidFill>
-                <a:latin typeface="+mn-lt"/>
-                <a:ea typeface="+mn-ea"/>
-                <a:cs typeface="+mn-cs"/>
-              </a:defRPr>
-            </a:lvl1pPr>
-            <a:lvl2pPr marL="566974" indent="0" algn="l" defTabSz="1133947" rtl="0" eaLnBrk="1" latinLnBrk="0" hangingPunct="1">
-              <a:lnSpc>
-                <a:spcPct val="90000"/>
-              </a:lnSpc>
-              <a:spcBef>
-                <a:spcPts val="620"/>
-              </a:spcBef>
-              <a:buFont typeface="Arial" panose="020B0604020202020204" pitchFamily="34" charset="0"/>
-              <a:buNone/>
-              <a:defRPr sz="2480" b="1" kern="1200">
-                <a:solidFill>
-                  <a:schemeClr val="tx1"/>
-                </a:solidFill>
-                <a:latin typeface="+mn-lt"/>
-                <a:ea typeface="+mn-ea"/>
-                <a:cs typeface="+mn-cs"/>
-              </a:defRPr>
-            </a:lvl2pPr>
-            <a:lvl3pPr marL="1133947" indent="0" algn="l" defTabSz="1133947" rtl="0" eaLnBrk="1" latinLnBrk="0" hangingPunct="1">
-              <a:lnSpc>
-                <a:spcPct val="90000"/>
-              </a:lnSpc>
-              <a:spcBef>
-                <a:spcPts val="620"/>
-              </a:spcBef>
-              <a:buFont typeface="Arial" panose="020B0604020202020204" pitchFamily="34" charset="0"/>
-              <a:buNone/>
-              <a:defRPr sz="2232" b="1" kern="1200">
-                <a:solidFill>
-                  <a:schemeClr val="tx1"/>
-                </a:solidFill>
-                <a:latin typeface="+mn-lt"/>
-                <a:ea typeface="+mn-ea"/>
-                <a:cs typeface="+mn-cs"/>
-              </a:defRPr>
-            </a:lvl3pPr>
-            <a:lvl4pPr marL="1700921" indent="0" algn="l" defTabSz="1133947" rtl="0" eaLnBrk="1" latinLnBrk="0" hangingPunct="1">
-              <a:lnSpc>
-                <a:spcPct val="90000"/>
-              </a:lnSpc>
-              <a:spcBef>
-                <a:spcPts val="620"/>
-              </a:spcBef>
-              <a:buFont typeface="Arial" panose="020B0604020202020204" pitchFamily="34" charset="0"/>
-              <a:buNone/>
-              <a:defRPr sz="1984" b="1" kern="1200">
-                <a:solidFill>
-                  <a:schemeClr val="tx1"/>
-                </a:solidFill>
-                <a:latin typeface="+mn-lt"/>
-                <a:ea typeface="+mn-ea"/>
-                <a:cs typeface="+mn-cs"/>
-              </a:defRPr>
-            </a:lvl4pPr>
-            <a:lvl5pPr marL="2267895" indent="0" algn="l" defTabSz="1133947" rtl="0" eaLnBrk="1" latinLnBrk="0" hangingPunct="1">
-              <a:lnSpc>
-                <a:spcPct val="90000"/>
-              </a:lnSpc>
-              <a:spcBef>
-                <a:spcPts val="620"/>
-              </a:spcBef>
-              <a:buFont typeface="Arial" panose="020B0604020202020204" pitchFamily="34" charset="0"/>
-              <a:buNone/>
-              <a:defRPr sz="1984" b="1" kern="1200">
-                <a:solidFill>
-                  <a:schemeClr val="tx1"/>
-                </a:solidFill>
-                <a:latin typeface="+mn-lt"/>
-                <a:ea typeface="+mn-ea"/>
-                <a:cs typeface="+mn-cs"/>
-              </a:defRPr>
-            </a:lvl5pPr>
-            <a:lvl6pPr marL="2834869" indent="0" algn="l" defTabSz="1133947" rtl="0" eaLnBrk="1" latinLnBrk="0" hangingPunct="1">
-              <a:lnSpc>
-                <a:spcPct val="90000"/>
-              </a:lnSpc>
-              <a:spcBef>
-                <a:spcPts val="620"/>
-              </a:spcBef>
-              <a:buFont typeface="Arial" panose="020B0604020202020204" pitchFamily="34" charset="0"/>
-              <a:buNone/>
-              <a:defRPr sz="1984" b="1" kern="1200">
-                <a:solidFill>
-                  <a:schemeClr val="tx1"/>
-                </a:solidFill>
-                <a:latin typeface="+mn-lt"/>
-                <a:ea typeface="+mn-ea"/>
-                <a:cs typeface="+mn-cs"/>
-              </a:defRPr>
-            </a:lvl6pPr>
-            <a:lvl7pPr marL="3401842" indent="0" algn="l" defTabSz="1133947" rtl="0" eaLnBrk="1" latinLnBrk="0" hangingPunct="1">
-              <a:lnSpc>
-                <a:spcPct val="90000"/>
-              </a:lnSpc>
-              <a:spcBef>
-                <a:spcPts val="620"/>
-              </a:spcBef>
-              <a:buFont typeface="Arial" panose="020B0604020202020204" pitchFamily="34" charset="0"/>
-              <a:buNone/>
-              <a:defRPr sz="1984" b="1" kern="1200">
-                <a:solidFill>
-                  <a:schemeClr val="tx1"/>
-                </a:solidFill>
-                <a:latin typeface="+mn-lt"/>
-                <a:ea typeface="+mn-ea"/>
-                <a:cs typeface="+mn-cs"/>
-              </a:defRPr>
-            </a:lvl7pPr>
-            <a:lvl8pPr marL="3968816" indent="0" algn="l" defTabSz="1133947" rtl="0" eaLnBrk="1" latinLnBrk="0" hangingPunct="1">
-              <a:lnSpc>
-                <a:spcPct val="90000"/>
-              </a:lnSpc>
-              <a:spcBef>
-                <a:spcPts val="620"/>
-              </a:spcBef>
-              <a:buFont typeface="Arial" panose="020B0604020202020204" pitchFamily="34" charset="0"/>
-              <a:buNone/>
-              <a:defRPr sz="1984" b="1" kern="1200">
-                <a:solidFill>
-                  <a:schemeClr val="tx1"/>
-                </a:solidFill>
-                <a:latin typeface="+mn-lt"/>
-                <a:ea typeface="+mn-ea"/>
-                <a:cs typeface="+mn-cs"/>
-              </a:defRPr>
-            </a:lvl8pPr>
-            <a:lvl9pPr marL="4535790" indent="0" algn="l" defTabSz="1133947" rtl="0" eaLnBrk="1" latinLnBrk="0" hangingPunct="1">
-              <a:lnSpc>
-                <a:spcPct val="90000"/>
-              </a:lnSpc>
-              <a:spcBef>
-                <a:spcPts val="620"/>
-              </a:spcBef>
-              <a:buFont typeface="Arial" panose="020B0604020202020204" pitchFamily="34" charset="0"/>
-              <a:buNone/>
-              <a:defRPr sz="1984" b="1" kern="1200">
-                <a:solidFill>
-                  <a:schemeClr val="tx1"/>
-                </a:solidFill>
-                <a:latin typeface="+mn-lt"/>
-                <a:ea typeface="+mn-ea"/>
-                <a:cs typeface="+mn-cs"/>
-              </a:defRPr>
-            </a:lvl9pPr>
-          </a:lstStyle>
-          <a:p>
-            <a:r>
-              <a:rPr lang="en-GB" dirty="0" smtClean="0"/>
-              <a:t>Aims and Objectives</a:t>
-            </a:r>
-            <a:endParaRPr lang="en-GB" dirty="0"/>
           </a:p>
         </p:txBody>
       </p:sp>
@@ -5899,6 +5163,607 @@
             <a:r>
               <a:rPr lang="en-GB" dirty="0" smtClean="0"/>
               <a:t> to lock projects throughout the whole system</a:t>
+            </a:r>
+            <a:endParaRPr lang="en-GB" dirty="0"/>
+          </a:p>
+        </p:txBody>
+      </p:sp>
+      <p:sp>
+        <p:nvSpPr>
+          <p:cNvPr id="16" name="Inhaltsplatzhalter 3"/>
+          <p:cNvSpPr txBox="1">
+            <a:spLocks/>
+          </p:cNvSpPr>
+          <p:nvPr/>
+        </p:nvSpPr>
+        <p:spPr>
+          <a:xfrm>
+            <a:off x="1041423" y="15525508"/>
+            <a:ext cx="6706914" cy="5447635"/>
+          </a:xfrm>
+          <a:prstGeom prst="rect">
+            <a:avLst/>
+          </a:prstGeom>
+        </p:spPr>
+        <p:txBody>
+          <a:bodyPr vert="horz" lIns="91440" tIns="45720" rIns="91440" bIns="45720" rtlCol="0">
+            <a:normAutofit fontScale="70000" lnSpcReduction="20000"/>
+          </a:bodyPr>
+          <a:lstStyle>
+            <a:lvl1pPr marL="283487" indent="-283487" algn="l" defTabSz="1133947" rtl="0" eaLnBrk="1" latinLnBrk="0" hangingPunct="1">
+              <a:lnSpc>
+                <a:spcPct val="90000"/>
+              </a:lnSpc>
+              <a:spcBef>
+                <a:spcPts val="1240"/>
+              </a:spcBef>
+              <a:buFont typeface="Arial" panose="020B0604020202020204" pitchFamily="34" charset="0"/>
+              <a:buChar char="•"/>
+              <a:defRPr sz="3472" kern="1200">
+                <a:solidFill>
+                  <a:schemeClr val="tx1"/>
+                </a:solidFill>
+                <a:latin typeface="+mn-lt"/>
+                <a:ea typeface="+mn-ea"/>
+                <a:cs typeface="+mn-cs"/>
+              </a:defRPr>
+            </a:lvl1pPr>
+            <a:lvl2pPr marL="850461" indent="-283487" algn="l" defTabSz="1133947" rtl="0" eaLnBrk="1" latinLnBrk="0" hangingPunct="1">
+              <a:lnSpc>
+                <a:spcPct val="90000"/>
+              </a:lnSpc>
+              <a:spcBef>
+                <a:spcPts val="620"/>
+              </a:spcBef>
+              <a:buFont typeface="Arial" panose="020B0604020202020204" pitchFamily="34" charset="0"/>
+              <a:buChar char="•"/>
+              <a:defRPr sz="2976" kern="1200">
+                <a:solidFill>
+                  <a:schemeClr val="tx1"/>
+                </a:solidFill>
+                <a:latin typeface="+mn-lt"/>
+                <a:ea typeface="+mn-ea"/>
+                <a:cs typeface="+mn-cs"/>
+              </a:defRPr>
+            </a:lvl2pPr>
+            <a:lvl3pPr marL="1417434" indent="-283487" algn="l" defTabSz="1133947" rtl="0" eaLnBrk="1" latinLnBrk="0" hangingPunct="1">
+              <a:lnSpc>
+                <a:spcPct val="90000"/>
+              </a:lnSpc>
+              <a:spcBef>
+                <a:spcPts val="620"/>
+              </a:spcBef>
+              <a:buFont typeface="Arial" panose="020B0604020202020204" pitchFamily="34" charset="0"/>
+              <a:buChar char="•"/>
+              <a:defRPr sz="2480" kern="1200">
+                <a:solidFill>
+                  <a:schemeClr val="tx1"/>
+                </a:solidFill>
+                <a:latin typeface="+mn-lt"/>
+                <a:ea typeface="+mn-ea"/>
+                <a:cs typeface="+mn-cs"/>
+              </a:defRPr>
+            </a:lvl3pPr>
+            <a:lvl4pPr marL="1984408" indent="-283487" algn="l" defTabSz="1133947" rtl="0" eaLnBrk="1" latinLnBrk="0" hangingPunct="1">
+              <a:lnSpc>
+                <a:spcPct val="90000"/>
+              </a:lnSpc>
+              <a:spcBef>
+                <a:spcPts val="620"/>
+              </a:spcBef>
+              <a:buFont typeface="Arial" panose="020B0604020202020204" pitchFamily="34" charset="0"/>
+              <a:buChar char="•"/>
+              <a:defRPr sz="2232" kern="1200">
+                <a:solidFill>
+                  <a:schemeClr val="tx1"/>
+                </a:solidFill>
+                <a:latin typeface="+mn-lt"/>
+                <a:ea typeface="+mn-ea"/>
+                <a:cs typeface="+mn-cs"/>
+              </a:defRPr>
+            </a:lvl4pPr>
+            <a:lvl5pPr marL="2551382" indent="-283487" algn="l" defTabSz="1133947" rtl="0" eaLnBrk="1" latinLnBrk="0" hangingPunct="1">
+              <a:lnSpc>
+                <a:spcPct val="90000"/>
+              </a:lnSpc>
+              <a:spcBef>
+                <a:spcPts val="620"/>
+              </a:spcBef>
+              <a:buFont typeface="Arial" panose="020B0604020202020204" pitchFamily="34" charset="0"/>
+              <a:buChar char="•"/>
+              <a:defRPr sz="2232" kern="1200">
+                <a:solidFill>
+                  <a:schemeClr val="tx1"/>
+                </a:solidFill>
+                <a:latin typeface="+mn-lt"/>
+                <a:ea typeface="+mn-ea"/>
+                <a:cs typeface="+mn-cs"/>
+              </a:defRPr>
+            </a:lvl5pPr>
+            <a:lvl6pPr marL="3118355" indent="-283487" algn="l" defTabSz="1133947" rtl="0" eaLnBrk="1" latinLnBrk="0" hangingPunct="1">
+              <a:lnSpc>
+                <a:spcPct val="90000"/>
+              </a:lnSpc>
+              <a:spcBef>
+                <a:spcPts val="620"/>
+              </a:spcBef>
+              <a:buFont typeface="Arial" panose="020B0604020202020204" pitchFamily="34" charset="0"/>
+              <a:buChar char="•"/>
+              <a:defRPr sz="2232" kern="1200">
+                <a:solidFill>
+                  <a:schemeClr val="tx1"/>
+                </a:solidFill>
+                <a:latin typeface="+mn-lt"/>
+                <a:ea typeface="+mn-ea"/>
+                <a:cs typeface="+mn-cs"/>
+              </a:defRPr>
+            </a:lvl6pPr>
+            <a:lvl7pPr marL="3685329" indent="-283487" algn="l" defTabSz="1133947" rtl="0" eaLnBrk="1" latinLnBrk="0" hangingPunct="1">
+              <a:lnSpc>
+                <a:spcPct val="90000"/>
+              </a:lnSpc>
+              <a:spcBef>
+                <a:spcPts val="620"/>
+              </a:spcBef>
+              <a:buFont typeface="Arial" panose="020B0604020202020204" pitchFamily="34" charset="0"/>
+              <a:buChar char="•"/>
+              <a:defRPr sz="2232" kern="1200">
+                <a:solidFill>
+                  <a:schemeClr val="tx1"/>
+                </a:solidFill>
+                <a:latin typeface="+mn-lt"/>
+                <a:ea typeface="+mn-ea"/>
+                <a:cs typeface="+mn-cs"/>
+              </a:defRPr>
+            </a:lvl7pPr>
+            <a:lvl8pPr marL="4252303" indent="-283487" algn="l" defTabSz="1133947" rtl="0" eaLnBrk="1" latinLnBrk="0" hangingPunct="1">
+              <a:lnSpc>
+                <a:spcPct val="90000"/>
+              </a:lnSpc>
+              <a:spcBef>
+                <a:spcPts val="620"/>
+              </a:spcBef>
+              <a:buFont typeface="Arial" panose="020B0604020202020204" pitchFamily="34" charset="0"/>
+              <a:buChar char="•"/>
+              <a:defRPr sz="2232" kern="1200">
+                <a:solidFill>
+                  <a:schemeClr val="tx1"/>
+                </a:solidFill>
+                <a:latin typeface="+mn-lt"/>
+                <a:ea typeface="+mn-ea"/>
+                <a:cs typeface="+mn-cs"/>
+              </a:defRPr>
+            </a:lvl8pPr>
+            <a:lvl9pPr marL="4819277" indent="-283487" algn="l" defTabSz="1133947" rtl="0" eaLnBrk="1" latinLnBrk="0" hangingPunct="1">
+              <a:lnSpc>
+                <a:spcPct val="90000"/>
+              </a:lnSpc>
+              <a:spcBef>
+                <a:spcPts val="620"/>
+              </a:spcBef>
+              <a:buFont typeface="Arial" panose="020B0604020202020204" pitchFamily="34" charset="0"/>
+              <a:buChar char="•"/>
+              <a:defRPr sz="2232" kern="1200">
+                <a:solidFill>
+                  <a:schemeClr val="tx1"/>
+                </a:solidFill>
+                <a:latin typeface="+mn-lt"/>
+                <a:ea typeface="+mn-ea"/>
+                <a:cs typeface="+mn-cs"/>
+              </a:defRPr>
+            </a:lvl9pPr>
+          </a:lstStyle>
+          <a:p>
+            <a:pPr marL="0" indent="0">
+              <a:buNone/>
+            </a:pPr>
+            <a:r>
+              <a:rPr lang="en-GB" b="1" dirty="0" smtClean="0"/>
+              <a:t>Challenges and Experimental Work</a:t>
+            </a:r>
+          </a:p>
+          <a:p>
+            <a:pPr marL="457200" indent="-457200"/>
+            <a:r>
+              <a:rPr lang="en-GB" dirty="0" smtClean="0"/>
+              <a:t>Finding a fitting network </a:t>
+            </a:r>
+            <a:r>
+              <a:rPr lang="en-GB" dirty="0" err="1" smtClean="0"/>
+              <a:t>filesystem</a:t>
+            </a:r>
+            <a:endParaRPr lang="en-GB" dirty="0" smtClean="0"/>
+          </a:p>
+          <a:p>
+            <a:pPr marL="457200" indent="-457200"/>
+            <a:r>
+              <a:rPr lang="en-GB" dirty="0" smtClean="0"/>
+              <a:t>Solely depend on a shared </a:t>
+            </a:r>
+            <a:r>
+              <a:rPr lang="en-GB" dirty="0" err="1" smtClean="0"/>
+              <a:t>filesystem</a:t>
+            </a:r>
+            <a:r>
+              <a:rPr lang="en-GB" dirty="0" smtClean="0"/>
+              <a:t> for communication and coordination to strip down external (system) dependencies</a:t>
+            </a:r>
+          </a:p>
+          <a:p>
+            <a:pPr marL="0" indent="0">
+              <a:buNone/>
+            </a:pPr>
+            <a:endParaRPr lang="en-GB" b="1" dirty="0"/>
+          </a:p>
+          <a:p>
+            <a:pPr marL="0" indent="0">
+              <a:buNone/>
+            </a:pPr>
+            <a:r>
+              <a:rPr lang="en-GB" b="1" dirty="0" smtClean="0"/>
+              <a:t>Results</a:t>
+            </a:r>
+          </a:p>
+          <a:p>
+            <a:pPr marL="457200" indent="-457200"/>
+            <a:r>
+              <a:rPr lang="en-GB" dirty="0" smtClean="0"/>
+              <a:t>Synchronous </a:t>
+            </a:r>
+            <a:r>
+              <a:rPr lang="en-GB" dirty="0" err="1" smtClean="0"/>
+              <a:t>EventSystem</a:t>
+            </a:r>
+            <a:r>
+              <a:rPr lang="en-GB" dirty="0" smtClean="0"/>
+              <a:t> with </a:t>
+            </a:r>
+            <a:r>
+              <a:rPr lang="en-GB" dirty="0" err="1" smtClean="0"/>
+              <a:t>Boradcast</a:t>
+            </a:r>
+            <a:r>
+              <a:rPr lang="en-GB" dirty="0" smtClean="0"/>
+              <a:t> functionality based on files on a shared </a:t>
+            </a:r>
+            <a:r>
+              <a:rPr lang="en-GB" dirty="0" err="1" smtClean="0"/>
+              <a:t>filesystem</a:t>
+            </a:r>
+            <a:endParaRPr lang="en-GB" dirty="0" smtClean="0"/>
+          </a:p>
+          <a:p>
+            <a:pPr marL="457200" indent="-457200"/>
+            <a:r>
+              <a:rPr lang="en-GB" dirty="0" smtClean="0"/>
+              <a:t>Implementation of a timeout based </a:t>
+            </a:r>
+            <a:r>
+              <a:rPr lang="en-GB" dirty="0" err="1" smtClean="0"/>
+              <a:t>mutex</a:t>
+            </a:r>
+            <a:r>
+              <a:rPr lang="en-GB" dirty="0" smtClean="0"/>
+              <a:t> on-top of the </a:t>
+            </a:r>
+            <a:r>
+              <a:rPr lang="en-GB" dirty="0" err="1" smtClean="0"/>
+              <a:t>EventSystem</a:t>
+            </a:r>
+            <a:r>
+              <a:rPr lang="en-GB" dirty="0" smtClean="0"/>
+              <a:t> to lock projects throughout the whole system</a:t>
+            </a:r>
+          </a:p>
+          <a:p>
+            <a:pPr marL="457200" indent="-457200"/>
+            <a:r>
+              <a:rPr lang="en-GB" dirty="0" smtClean="0"/>
+              <a:t>Much more time efficient because of higher hardware utilization due to automatic stage execution</a:t>
+            </a:r>
+            <a:endParaRPr lang="en-GB" dirty="0"/>
+          </a:p>
+        </p:txBody>
+      </p:sp>
+      <p:sp>
+        <p:nvSpPr>
+          <p:cNvPr id="17" name="Inhaltsplatzhalter 3"/>
+          <p:cNvSpPr txBox="1">
+            <a:spLocks/>
+          </p:cNvSpPr>
+          <p:nvPr/>
+        </p:nvSpPr>
+        <p:spPr>
+          <a:xfrm>
+            <a:off x="8286750" y="8692557"/>
+            <a:ext cx="6211084" cy="6289895"/>
+          </a:xfrm>
+          <a:prstGeom prst="rect">
+            <a:avLst/>
+          </a:prstGeom>
+        </p:spPr>
+        <p:txBody>
+          <a:bodyPr vert="horz" lIns="91440" tIns="45720" rIns="91440" bIns="45720" rtlCol="0">
+            <a:normAutofit fontScale="70000" lnSpcReduction="20000"/>
+          </a:bodyPr>
+          <a:lstStyle>
+            <a:lvl1pPr marL="283487" indent="-283487" algn="l" defTabSz="1133947" rtl="0" eaLnBrk="1" latinLnBrk="0" hangingPunct="1">
+              <a:lnSpc>
+                <a:spcPct val="90000"/>
+              </a:lnSpc>
+              <a:spcBef>
+                <a:spcPts val="1240"/>
+              </a:spcBef>
+              <a:buFont typeface="Arial" panose="020B0604020202020204" pitchFamily="34" charset="0"/>
+              <a:buChar char="•"/>
+              <a:defRPr sz="3472" kern="1200">
+                <a:solidFill>
+                  <a:schemeClr val="tx1"/>
+                </a:solidFill>
+                <a:latin typeface="+mn-lt"/>
+                <a:ea typeface="+mn-ea"/>
+                <a:cs typeface="+mn-cs"/>
+              </a:defRPr>
+            </a:lvl1pPr>
+            <a:lvl2pPr marL="850461" indent="-283487" algn="l" defTabSz="1133947" rtl="0" eaLnBrk="1" latinLnBrk="0" hangingPunct="1">
+              <a:lnSpc>
+                <a:spcPct val="90000"/>
+              </a:lnSpc>
+              <a:spcBef>
+                <a:spcPts val="620"/>
+              </a:spcBef>
+              <a:buFont typeface="Arial" panose="020B0604020202020204" pitchFamily="34" charset="0"/>
+              <a:buChar char="•"/>
+              <a:defRPr sz="2976" kern="1200">
+                <a:solidFill>
+                  <a:schemeClr val="tx1"/>
+                </a:solidFill>
+                <a:latin typeface="+mn-lt"/>
+                <a:ea typeface="+mn-ea"/>
+                <a:cs typeface="+mn-cs"/>
+              </a:defRPr>
+            </a:lvl2pPr>
+            <a:lvl3pPr marL="1417434" indent="-283487" algn="l" defTabSz="1133947" rtl="0" eaLnBrk="1" latinLnBrk="0" hangingPunct="1">
+              <a:lnSpc>
+                <a:spcPct val="90000"/>
+              </a:lnSpc>
+              <a:spcBef>
+                <a:spcPts val="620"/>
+              </a:spcBef>
+              <a:buFont typeface="Arial" panose="020B0604020202020204" pitchFamily="34" charset="0"/>
+              <a:buChar char="•"/>
+              <a:defRPr sz="2480" kern="1200">
+                <a:solidFill>
+                  <a:schemeClr val="tx1"/>
+                </a:solidFill>
+                <a:latin typeface="+mn-lt"/>
+                <a:ea typeface="+mn-ea"/>
+                <a:cs typeface="+mn-cs"/>
+              </a:defRPr>
+            </a:lvl3pPr>
+            <a:lvl4pPr marL="1984408" indent="-283487" algn="l" defTabSz="1133947" rtl="0" eaLnBrk="1" latinLnBrk="0" hangingPunct="1">
+              <a:lnSpc>
+                <a:spcPct val="90000"/>
+              </a:lnSpc>
+              <a:spcBef>
+                <a:spcPts val="620"/>
+              </a:spcBef>
+              <a:buFont typeface="Arial" panose="020B0604020202020204" pitchFamily="34" charset="0"/>
+              <a:buChar char="•"/>
+              <a:defRPr sz="2232" kern="1200">
+                <a:solidFill>
+                  <a:schemeClr val="tx1"/>
+                </a:solidFill>
+                <a:latin typeface="+mn-lt"/>
+                <a:ea typeface="+mn-ea"/>
+                <a:cs typeface="+mn-cs"/>
+              </a:defRPr>
+            </a:lvl4pPr>
+            <a:lvl5pPr marL="2551382" indent="-283487" algn="l" defTabSz="1133947" rtl="0" eaLnBrk="1" latinLnBrk="0" hangingPunct="1">
+              <a:lnSpc>
+                <a:spcPct val="90000"/>
+              </a:lnSpc>
+              <a:spcBef>
+                <a:spcPts val="620"/>
+              </a:spcBef>
+              <a:buFont typeface="Arial" panose="020B0604020202020204" pitchFamily="34" charset="0"/>
+              <a:buChar char="•"/>
+              <a:defRPr sz="2232" kern="1200">
+                <a:solidFill>
+                  <a:schemeClr val="tx1"/>
+                </a:solidFill>
+                <a:latin typeface="+mn-lt"/>
+                <a:ea typeface="+mn-ea"/>
+                <a:cs typeface="+mn-cs"/>
+              </a:defRPr>
+            </a:lvl5pPr>
+            <a:lvl6pPr marL="3118355" indent="-283487" algn="l" defTabSz="1133947" rtl="0" eaLnBrk="1" latinLnBrk="0" hangingPunct="1">
+              <a:lnSpc>
+                <a:spcPct val="90000"/>
+              </a:lnSpc>
+              <a:spcBef>
+                <a:spcPts val="620"/>
+              </a:spcBef>
+              <a:buFont typeface="Arial" panose="020B0604020202020204" pitchFamily="34" charset="0"/>
+              <a:buChar char="•"/>
+              <a:defRPr sz="2232" kern="1200">
+                <a:solidFill>
+                  <a:schemeClr val="tx1"/>
+                </a:solidFill>
+                <a:latin typeface="+mn-lt"/>
+                <a:ea typeface="+mn-ea"/>
+                <a:cs typeface="+mn-cs"/>
+              </a:defRPr>
+            </a:lvl6pPr>
+            <a:lvl7pPr marL="3685329" indent="-283487" algn="l" defTabSz="1133947" rtl="0" eaLnBrk="1" latinLnBrk="0" hangingPunct="1">
+              <a:lnSpc>
+                <a:spcPct val="90000"/>
+              </a:lnSpc>
+              <a:spcBef>
+                <a:spcPts val="620"/>
+              </a:spcBef>
+              <a:buFont typeface="Arial" panose="020B0604020202020204" pitchFamily="34" charset="0"/>
+              <a:buChar char="•"/>
+              <a:defRPr sz="2232" kern="1200">
+                <a:solidFill>
+                  <a:schemeClr val="tx1"/>
+                </a:solidFill>
+                <a:latin typeface="+mn-lt"/>
+                <a:ea typeface="+mn-ea"/>
+                <a:cs typeface="+mn-cs"/>
+              </a:defRPr>
+            </a:lvl7pPr>
+            <a:lvl8pPr marL="4252303" indent="-283487" algn="l" defTabSz="1133947" rtl="0" eaLnBrk="1" latinLnBrk="0" hangingPunct="1">
+              <a:lnSpc>
+                <a:spcPct val="90000"/>
+              </a:lnSpc>
+              <a:spcBef>
+                <a:spcPts val="620"/>
+              </a:spcBef>
+              <a:buFont typeface="Arial" panose="020B0604020202020204" pitchFamily="34" charset="0"/>
+              <a:buChar char="•"/>
+              <a:defRPr sz="2232" kern="1200">
+                <a:solidFill>
+                  <a:schemeClr val="tx1"/>
+                </a:solidFill>
+                <a:latin typeface="+mn-lt"/>
+                <a:ea typeface="+mn-ea"/>
+                <a:cs typeface="+mn-cs"/>
+              </a:defRPr>
+            </a:lvl8pPr>
+            <a:lvl9pPr marL="4819277" indent="-283487" algn="l" defTabSz="1133947" rtl="0" eaLnBrk="1" latinLnBrk="0" hangingPunct="1">
+              <a:lnSpc>
+                <a:spcPct val="90000"/>
+              </a:lnSpc>
+              <a:spcBef>
+                <a:spcPts val="620"/>
+              </a:spcBef>
+              <a:buFont typeface="Arial" panose="020B0604020202020204" pitchFamily="34" charset="0"/>
+              <a:buChar char="•"/>
+              <a:defRPr sz="2232" kern="1200">
+                <a:solidFill>
+                  <a:schemeClr val="tx1"/>
+                </a:solidFill>
+                <a:latin typeface="+mn-lt"/>
+                <a:ea typeface="+mn-ea"/>
+                <a:cs typeface="+mn-cs"/>
+              </a:defRPr>
+            </a:lvl9pPr>
+          </a:lstStyle>
+          <a:p>
+            <a:pPr marL="0" indent="0">
+              <a:buNone/>
+            </a:pPr>
+            <a:r>
+              <a:rPr lang="en-GB" b="1" dirty="0"/>
+              <a:t>Further </a:t>
+            </a:r>
+            <a:r>
+              <a:rPr lang="en-GB" b="1" dirty="0" smtClean="0"/>
+              <a:t>Requirements </a:t>
+            </a:r>
+            <a:r>
+              <a:rPr lang="en-GB" b="1" dirty="0"/>
+              <a:t>and </a:t>
+            </a:r>
+            <a:r>
+              <a:rPr lang="en-GB" b="1" dirty="0" smtClean="0"/>
+              <a:t>Objectives</a:t>
+            </a:r>
+          </a:p>
+          <a:p>
+            <a:pPr marL="457200" indent="-457200"/>
+            <a:r>
+              <a:rPr lang="en-GB" dirty="0" smtClean="0"/>
+              <a:t>Automatically distribute jobs onto computing nodes</a:t>
+            </a:r>
+          </a:p>
+          <a:p>
+            <a:pPr marL="457200" indent="-457200"/>
+            <a:r>
+              <a:rPr lang="en-GB" dirty="0" smtClean="0"/>
+              <a:t>Handle large files (4k video footage) </a:t>
+            </a:r>
+            <a:r>
+              <a:rPr lang="en-GB" dirty="0"/>
+              <a:t>and multiple projects</a:t>
+            </a:r>
+            <a:endParaRPr lang="en-GB" dirty="0" smtClean="0"/>
+          </a:p>
+          <a:p>
+            <a:pPr marL="457200" indent="-457200"/>
+            <a:r>
+              <a:rPr lang="en-GB" dirty="0" smtClean="0"/>
+              <a:t>Representation as multi-stage pipeline that can be paused at any stage and investigated, to re-do stages with optimized parameters</a:t>
+            </a:r>
+          </a:p>
+          <a:p>
+            <a:pPr marL="457200" indent="-457200"/>
+            <a:r>
+              <a:rPr lang="en-GB" dirty="0" smtClean="0"/>
+              <a:t>Consider specific hardware requirements for CV and AI</a:t>
+            </a:r>
+          </a:p>
+          <a:p>
+            <a:pPr marL="457200" indent="-457200"/>
+            <a:endParaRPr lang="en-GB" dirty="0" smtClean="0"/>
+          </a:p>
+          <a:p>
+            <a:pPr marL="0" indent="0">
+              <a:buNone/>
+            </a:pPr>
+            <a:r>
+              <a:rPr lang="en-GB" b="1" dirty="0" smtClean="0"/>
+              <a:t>Architecture, Design and Technologies</a:t>
+            </a:r>
+            <a:endParaRPr lang="en-GB" b="1" dirty="0"/>
+          </a:p>
+          <a:p>
+            <a:pPr marL="457200" indent="-457200"/>
+            <a:r>
+              <a:rPr lang="en-GB" u="sng" dirty="0"/>
+              <a:t>Decentralized</a:t>
+            </a:r>
+            <a:r>
+              <a:rPr lang="en-GB" dirty="0"/>
+              <a:t> </a:t>
+            </a:r>
+            <a:r>
+              <a:rPr lang="en-GB" dirty="0" smtClean="0"/>
+              <a:t>decision making</a:t>
+            </a:r>
+          </a:p>
+          <a:p>
+            <a:pPr marL="457200" indent="-457200"/>
+            <a:r>
+              <a:rPr lang="en-GB" u="sng" dirty="0" smtClean="0"/>
+              <a:t>Resilient</a:t>
+            </a:r>
+            <a:r>
+              <a:rPr lang="en-GB" dirty="0" smtClean="0"/>
+              <a:t> against node failures</a:t>
+            </a:r>
+          </a:p>
+          <a:p>
+            <a:pPr marL="457200" indent="-457200"/>
+            <a:r>
+              <a:rPr lang="en-GB" dirty="0" smtClean="0"/>
+              <a:t>Shared network </a:t>
+            </a:r>
+            <a:r>
+              <a:rPr lang="en-GB" dirty="0" err="1" smtClean="0"/>
+              <a:t>filesystem</a:t>
+            </a:r>
+            <a:r>
+              <a:rPr lang="en-GB" dirty="0" smtClean="0"/>
+              <a:t> for data, configuration and coordination</a:t>
+            </a:r>
+          </a:p>
+          <a:p>
+            <a:pPr marL="457200" indent="-457200"/>
+            <a:r>
+              <a:rPr lang="en-GB" dirty="0" smtClean="0"/>
+              <a:t>Docker for easy installation of additional compute nodes</a:t>
             </a:r>
             <a:endParaRPr lang="en-GB" dirty="0"/>
           </a:p>

</xml_diff>

<commit_message>
Doing se arrow thingy with before/after images
</commit_message>
<xml_diff>
--- a/presentation.pptx
+++ b/presentation.pptx
@@ -3068,6 +3068,114 @@
       </p:grpSpPr>
       <p:sp>
         <p:nvSpPr>
+          <p:cNvPr id="63" name="Pfeil nach unten 62"/>
+          <p:cNvSpPr/>
+          <p:nvPr/>
+        </p:nvSpPr>
+        <p:spPr>
+          <a:xfrm rot="17043736">
+            <a:off x="8339841" y="12738204"/>
+            <a:ext cx="1257300" cy="3592950"/>
+          </a:xfrm>
+          <a:prstGeom prst="downArrow">
+            <a:avLst/>
+          </a:prstGeom>
+          <a:solidFill>
+            <a:schemeClr val="accent1">
+              <a:lumMod val="20000"/>
+              <a:lumOff val="80000"/>
+            </a:schemeClr>
+          </a:solidFill>
+          <a:ln>
+            <a:solidFill>
+              <a:schemeClr val="accent1">
+                <a:lumMod val="60000"/>
+                <a:lumOff val="40000"/>
+              </a:schemeClr>
+            </a:solidFill>
+          </a:ln>
+        </p:spPr>
+        <p:style>
+          <a:lnRef idx="2">
+            <a:schemeClr val="accent1">
+              <a:shade val="50000"/>
+            </a:schemeClr>
+          </a:lnRef>
+          <a:fillRef idx="1">
+            <a:schemeClr val="accent1"/>
+          </a:fillRef>
+          <a:effectRef idx="0">
+            <a:schemeClr val="accent1"/>
+          </a:effectRef>
+          <a:fontRef idx="minor">
+            <a:schemeClr val="lt1"/>
+          </a:fontRef>
+        </p:style>
+        <p:txBody>
+          <a:bodyPr rtlCol="0" anchor="ctr"/>
+          <a:lstStyle/>
+          <a:p>
+            <a:pPr algn="ctr"/>
+            <a:endParaRPr lang="de-DE"/>
+          </a:p>
+        </p:txBody>
+      </p:sp>
+      <p:sp>
+        <p:nvSpPr>
+          <p:cNvPr id="62" name="Pfeil nach unten 61"/>
+          <p:cNvSpPr/>
+          <p:nvPr/>
+        </p:nvSpPr>
+        <p:spPr>
+          <a:xfrm rot="3627304">
+            <a:off x="8619954" y="5772117"/>
+            <a:ext cx="1257300" cy="4215539"/>
+          </a:xfrm>
+          <a:prstGeom prst="downArrow">
+            <a:avLst/>
+          </a:prstGeom>
+          <a:solidFill>
+            <a:schemeClr val="accent1">
+              <a:lumMod val="20000"/>
+              <a:lumOff val="80000"/>
+            </a:schemeClr>
+          </a:solidFill>
+          <a:ln>
+            <a:solidFill>
+              <a:schemeClr val="accent1">
+                <a:lumMod val="60000"/>
+                <a:lumOff val="40000"/>
+              </a:schemeClr>
+            </a:solidFill>
+          </a:ln>
+        </p:spPr>
+        <p:style>
+          <a:lnRef idx="2">
+            <a:schemeClr val="accent1">
+              <a:shade val="50000"/>
+            </a:schemeClr>
+          </a:lnRef>
+          <a:fillRef idx="1">
+            <a:schemeClr val="accent1"/>
+          </a:fillRef>
+          <a:effectRef idx="0">
+            <a:schemeClr val="accent1"/>
+          </a:effectRef>
+          <a:fontRef idx="minor">
+            <a:schemeClr val="lt1"/>
+          </a:fontRef>
+        </p:style>
+        <p:txBody>
+          <a:bodyPr rtlCol="0" anchor="ctr"/>
+          <a:lstStyle/>
+          <a:p>
+            <a:pPr algn="ctr"/>
+            <a:endParaRPr lang="de-DE"/>
+          </a:p>
+        </p:txBody>
+      </p:sp>
+      <p:sp>
+        <p:nvSpPr>
           <p:cNvPr id="4" name="Titel 3"/>
           <p:cNvSpPr>
             <a:spLocks noGrp="1"/>
@@ -3746,7 +3854,7 @@
           <p:nvPr/>
         </p:nvPicPr>
         <p:blipFill>
-          <a:blip r:embed="rId4" cstate="print">
+          <a:blip r:embed="rId4">
             <a:extLst>
               <a:ext uri="{28A0092B-C50C-407E-A947-70E740481C1C}">
                 <a14:useLocalDpi xmlns:a14="http://schemas.microsoft.com/office/drawing/2010/main" val="0"/>
@@ -3759,8 +3867,8 @@
         </p:blipFill>
         <p:spPr>
           <a:xfrm>
-            <a:off x="10753459" y="5415374"/>
-            <a:ext cx="3328403" cy="1872227"/>
+            <a:off x="10753459" y="5441377"/>
+            <a:ext cx="3328403" cy="1820220"/>
           </a:xfrm>
           <a:prstGeom prst="rect">
             <a:avLst/>
@@ -4629,14 +4737,14 @@
       </p:sp>
       <p:pic>
         <p:nvPicPr>
-          <p:cNvPr id="54" name="Inhaltsplatzhalter 12"/>
+          <p:cNvPr id="59" name="Grafik 58"/>
           <p:cNvPicPr>
             <a:picLocks noChangeAspect="1"/>
           </p:cNvPicPr>
           <p:nvPr/>
         </p:nvPicPr>
         <p:blipFill>
-          <a:blip r:embed="rId10" cstate="print">
+          <a:blip r:embed="rId10">
             <a:extLst>
               <a:ext uri="{28A0092B-C50C-407E-A947-70E740481C1C}">
                 <a14:useLocalDpi xmlns:a14="http://schemas.microsoft.com/office/drawing/2010/main" val="0"/>
@@ -4649,52 +4757,20 @@
         </p:blipFill>
         <p:spPr>
           <a:xfrm>
-            <a:off x="12803763" y="13033173"/>
-            <a:ext cx="1694071" cy="2255536"/>
+            <a:off x="10753459" y="14096391"/>
+            <a:ext cx="3235946" cy="1820220"/>
           </a:xfrm>
           <a:prstGeom prst="rect">
             <a:avLst/>
           </a:prstGeom>
+          <a:ln>
+            <a:noFill/>
+          </a:ln>
+          <a:effectLst>
+            <a:softEdge rad="112500"/>
+          </a:effectLst>
         </p:spPr>
       </p:pic>
-      <p:sp>
-        <p:nvSpPr>
-          <p:cNvPr id="55" name="Textfeld 54"/>
-          <p:cNvSpPr txBox="1"/>
-          <p:nvPr/>
-        </p:nvSpPr>
-        <p:spPr>
-          <a:xfrm>
-            <a:off x="11964184" y="15331836"/>
-            <a:ext cx="2533650" cy="584775"/>
-          </a:xfrm>
-          <a:prstGeom prst="rect">
-            <a:avLst/>
-          </a:prstGeom>
-          <a:noFill/>
-        </p:spPr>
-        <p:txBody>
-          <a:bodyPr wrap="square" rtlCol="0">
-            <a:spAutoFit/>
-          </a:bodyPr>
-          <a:lstStyle/>
-          <a:p>
-            <a:pPr algn="r"/>
-            <a:r>
-              <a:rPr lang="de-DE" dirty="0" smtClean="0"/>
-              <a:t>Frederick Winslow Taylor</a:t>
-            </a:r>
-          </a:p>
-          <a:p>
-            <a:pPr algn="r"/>
-            <a:r>
-              <a:rPr lang="de-DE" sz="1400" dirty="0" smtClean="0"/>
-              <a:t>1856 - 1915</a:t>
-            </a:r>
-            <a:endParaRPr lang="de-DE" sz="1400" dirty="0"/>
-          </a:p>
-        </p:txBody>
-      </p:sp>
     </p:spTree>
     <p:extLst>
       <p:ext uri="{BB962C8B-B14F-4D97-AF65-F5344CB8AC3E}">

</xml_diff>

<commit_message>
Fix typo and arrow origin
</commit_message>
<xml_diff>
--- a/presentation.pptx
+++ b/presentation.pptx
@@ -3074,8 +3074,8 @@
         </p:nvSpPr>
         <p:spPr>
           <a:xfrm rot="17043736">
-            <a:off x="8339841" y="12738204"/>
-            <a:ext cx="1257300" cy="3592950"/>
+            <a:off x="7966392" y="12259674"/>
+            <a:ext cx="1257300" cy="4362923"/>
           </a:xfrm>
           <a:prstGeom prst="downArrow">
             <a:avLst/>
@@ -4241,16 +4241,12 @@
               <a:t> with timeout based </a:t>
             </a:r>
             <a:r>
-              <a:rPr lang="en-GB" dirty="0" err="1" smtClean="0"/>
+              <a:rPr lang="en-GB" err="1" smtClean="0"/>
               <a:t>mutex</a:t>
             </a:r>
             <a:r>
-              <a:rPr lang="en-GB" dirty="0" smtClean="0"/>
-              <a:t> </a:t>
-            </a:r>
-            <a:r>
-              <a:rPr lang="en-GB" dirty="0" err="1" smtClean="0"/>
-              <a:t>ontop</a:t>
+              <a:rPr lang="en-GB" smtClean="0"/>
+              <a:t> on top</a:t>
             </a:r>
             <a:endParaRPr lang="en-GB" dirty="0"/>
           </a:p>

</xml_diff>